<commit_message>
add 1st module projectsAdd title slide
</commit_message>
<xml_diff>
--- a/PRESENTATION/Presentation Template_UCP25.pptx
+++ b/PRESENTATION/Presentation Template_UCP25.pptx
@@ -5,57 +5,55 @@
     <p:sldMasterId id="2147483648" r:id="rId4"/>
   </p:sldMasterIdLst>
   <p:notesMasterIdLst>
-    <p:notesMasterId r:id="rId25"/>
+    <p:notesMasterId r:id="rId23"/>
   </p:notesMasterIdLst>
   <p:handoutMasterIdLst>
-    <p:handoutMasterId r:id="rId26"/>
+    <p:handoutMasterId r:id="rId24"/>
   </p:handoutMasterIdLst>
   <p:sldIdLst>
-    <p:sldId id="276" r:id="rId5"/>
-    <p:sldId id="272" r:id="rId6"/>
-    <p:sldId id="273" r:id="rId7"/>
-    <p:sldId id="274" r:id="rId8"/>
-    <p:sldId id="275" r:id="rId9"/>
-    <p:sldId id="277" r:id="rId10"/>
-    <p:sldId id="269" r:id="rId11"/>
-    <p:sldId id="262" r:id="rId12"/>
-    <p:sldId id="257" r:id="rId13"/>
-    <p:sldId id="266" r:id="rId14"/>
-    <p:sldId id="267" r:id="rId15"/>
-    <p:sldId id="258" r:id="rId16"/>
-    <p:sldId id="270" r:id="rId17"/>
-    <p:sldId id="268" r:id="rId18"/>
-    <p:sldId id="271" r:id="rId19"/>
-    <p:sldId id="259" r:id="rId20"/>
-    <p:sldId id="265" r:id="rId21"/>
-    <p:sldId id="260" r:id="rId22"/>
-    <p:sldId id="264" r:id="rId23"/>
-    <p:sldId id="261" r:id="rId24"/>
+    <p:sldId id="273" r:id="rId5"/>
+    <p:sldId id="274" r:id="rId6"/>
+    <p:sldId id="275" r:id="rId7"/>
+    <p:sldId id="277" r:id="rId8"/>
+    <p:sldId id="269" r:id="rId9"/>
+    <p:sldId id="262" r:id="rId10"/>
+    <p:sldId id="258" r:id="rId11"/>
+    <p:sldId id="257" r:id="rId12"/>
+    <p:sldId id="266" r:id="rId13"/>
+    <p:sldId id="267" r:id="rId14"/>
+    <p:sldId id="270" r:id="rId15"/>
+    <p:sldId id="268" r:id="rId16"/>
+    <p:sldId id="271" r:id="rId17"/>
+    <p:sldId id="259" r:id="rId18"/>
+    <p:sldId id="265" r:id="rId19"/>
+    <p:sldId id="260" r:id="rId20"/>
+    <p:sldId id="264" r:id="rId21"/>
+    <p:sldId id="261" r:id="rId22"/>
   </p:sldIdLst>
   <p:sldSz cx="12192000" cy="6858000"/>
   <p:notesSz cx="6858000" cy="9144000"/>
   <p:embeddedFontLst>
     <p:embeddedFont>
       <p:font typeface="Aptos Light" panose="020B0004020202020204" pitchFamily="34" charset="0"/>
-      <p:regular r:id="rId27"/>
-      <p:italic r:id="rId28"/>
+      <p:regular r:id="rId25"/>
+      <p:italic r:id="rId26"/>
     </p:embeddedFont>
     <p:embeddedFont>
       <p:font typeface="Consolas" panose="020B0609020204030204" pitchFamily="49" charset="0"/>
-      <p:regular r:id="rId29"/>
-      <p:bold r:id="rId30"/>
-      <p:italic r:id="rId31"/>
-      <p:boldItalic r:id="rId32"/>
+      <p:regular r:id="rId27"/>
+      <p:bold r:id="rId28"/>
+      <p:italic r:id="rId29"/>
+      <p:boldItalic r:id="rId30"/>
     </p:embeddedFont>
     <p:embeddedFont>
-      <p:font typeface="Prometo Light" panose="020B0604020202020204" charset="0"/>
+      <p:font typeface="Prometo Light" panose="020B0604020202020204" charset="-18"/>
+      <p:regular r:id="rId31"/>
+      <p:italic r:id="rId32"/>
+    </p:embeddedFont>
+    <p:embeddedFont>
+      <p:font typeface="Raleway Light" pitchFamily="2" charset="-18"/>
       <p:regular r:id="rId33"/>
       <p:italic r:id="rId34"/>
-    </p:embeddedFont>
-    <p:embeddedFont>
-      <p:font typeface="Raleway Light" pitchFamily="2" charset="0"/>
-      <p:regular r:id="rId35"/>
-      <p:italic r:id="rId36"/>
     </p:embeddedFont>
   </p:embeddedFontLst>
   <p:defaultTextStyle>
@@ -158,8 +156,6 @@
       <p14:sectionLst xmlns:p14="http://schemas.microsoft.com/office/powerpoint/2010/main">
         <p14:section name="Spakers Guide" id="{27795A13-53A3-47E6-A341-D8DB6B118A66}">
           <p14:sldIdLst>
-            <p14:sldId id="276"/>
-            <p14:sldId id="272"/>
             <p14:sldId id="273"/>
             <p14:sldId id="274"/>
             <p14:sldId id="275"/>
@@ -174,10 +170,10 @@
         </p14:section>
         <p14:section name="Content" id="{00D488AD-5A18-E940-8549-58472631C3A5}">
           <p14:sldIdLst>
+            <p14:sldId id="258"/>
             <p14:sldId id="257"/>
             <p14:sldId id="266"/>
             <p14:sldId id="267"/>
-            <p14:sldId id="258"/>
             <p14:sldId id="270"/>
             <p14:sldId id="268"/>
             <p14:sldId id="271"/>
@@ -306,7 +302,7 @@
           <a:p>
             <a:fld id="{7D2B4123-62FB-4EA6-8374-9D69607216F1}" type="datetimeFigureOut">
               <a:rPr lang="cs-CZ" smtClean="0"/>
-              <a:t>30.10.2025</a:t>
+              <a:t>08.11.2025</a:t>
             </a:fld>
             <a:endParaRPr lang="cs-CZ"/>
           </a:p>
@@ -483,7 +479,7 @@
           <a:p>
             <a:fld id="{439AFF28-30F9-4D66-97A7-78501E5564CC}" type="datetimeFigureOut">
               <a:rPr lang="cs-CZ" smtClean="0"/>
-              <a:t>30.10.2025</a:t>
+              <a:t>08.11.2025</a:t>
             </a:fld>
             <a:endParaRPr lang="cs-CZ"/>
           </a:p>
@@ -815,7 +811,7 @@
           <a:p>
             <a:fld id="{ED91DD3D-A8C7-435A-9592-7745C7B0B046}" type="slidenum">
               <a:rPr lang="cs-CZ" smtClean="0"/>
-              <a:t>3</a:t>
+              <a:t>1</a:t>
             </a:fld>
             <a:endParaRPr lang="cs-CZ"/>
           </a:p>
@@ -923,7 +919,7 @@
           <a:p>
             <a:fld id="{ED91DD3D-A8C7-435A-9592-7745C7B0B046}" type="slidenum">
               <a:rPr lang="cs-CZ" smtClean="0"/>
-              <a:t>19</a:t>
+              <a:t>17</a:t>
             </a:fld>
             <a:endParaRPr lang="cs-CZ"/>
           </a:p>
@@ -1007,7 +1003,7 @@
           <a:p>
             <a:fld id="{ED91DD3D-A8C7-435A-9592-7745C7B0B046}" type="slidenum">
               <a:rPr lang="cs-CZ" smtClean="0"/>
-              <a:t>20</a:t>
+              <a:t>18</a:t>
             </a:fld>
             <a:endParaRPr lang="cs-CZ"/>
           </a:p>
@@ -1091,7 +1087,7 @@
           <a:p>
             <a:fld id="{ED91DD3D-A8C7-435A-9592-7745C7B0B046}" type="slidenum">
               <a:rPr lang="cs-CZ" smtClean="0"/>
-              <a:t>6</a:t>
+              <a:t>4</a:t>
             </a:fld>
             <a:endParaRPr lang="cs-CZ"/>
           </a:p>
@@ -1175,7 +1171,7 @@
           <a:p>
             <a:fld id="{ED91DD3D-A8C7-435A-9592-7745C7B0B046}" type="slidenum">
               <a:rPr lang="cs-CZ" smtClean="0"/>
-              <a:t>7</a:t>
+              <a:t>5</a:t>
             </a:fld>
             <a:endParaRPr lang="cs-CZ"/>
           </a:p>
@@ -1259,7 +1255,7 @@
           <a:p>
             <a:fld id="{ED91DD3D-A8C7-435A-9592-7745C7B0B046}" type="slidenum">
               <a:rPr lang="cs-CZ" smtClean="0"/>
-              <a:t>9</a:t>
+              <a:t>8</a:t>
             </a:fld>
             <a:endParaRPr lang="cs-CZ"/>
           </a:p>
@@ -1367,7 +1363,7 @@
           <a:p>
             <a:fld id="{ED91DD3D-A8C7-435A-9592-7745C7B0B046}" type="slidenum">
               <a:rPr lang="cs-CZ" smtClean="0"/>
-              <a:t>10</a:t>
+              <a:t>9</a:t>
             </a:fld>
             <a:endParaRPr lang="cs-CZ"/>
           </a:p>
@@ -1475,7 +1471,7 @@
           <a:p>
             <a:fld id="{ED91DD3D-A8C7-435A-9592-7745C7B0B046}" type="slidenum">
               <a:rPr lang="cs-CZ" smtClean="0"/>
-              <a:t>11</a:t>
+              <a:t>10</a:t>
             </a:fld>
             <a:endParaRPr lang="cs-CZ"/>
           </a:p>
@@ -1559,7 +1555,7 @@
           <a:p>
             <a:fld id="{ED91DD3D-A8C7-435A-9592-7745C7B0B046}" type="slidenum">
               <a:rPr lang="cs-CZ" smtClean="0"/>
-              <a:t>16</a:t>
+              <a:t>14</a:t>
             </a:fld>
             <a:endParaRPr lang="cs-CZ"/>
           </a:p>
@@ -1667,7 +1663,7 @@
           <a:p>
             <a:fld id="{ED91DD3D-A8C7-435A-9592-7745C7B0B046}" type="slidenum">
               <a:rPr lang="cs-CZ" smtClean="0"/>
-              <a:t>17</a:t>
+              <a:t>15</a:t>
             </a:fld>
             <a:endParaRPr lang="cs-CZ"/>
           </a:p>
@@ -1751,7 +1747,7 @@
           <a:p>
             <a:fld id="{ED91DD3D-A8C7-435A-9592-7745C7B0B046}" type="slidenum">
               <a:rPr lang="cs-CZ" smtClean="0"/>
-              <a:t>18</a:t>
+              <a:t>16</a:t>
             </a:fld>
             <a:endParaRPr lang="cs-CZ"/>
           </a:p>
@@ -2225,7 +2221,7 @@
           <a:p>
             <a:fld id="{92357268-C79A-4225-9F2D-63360B661E37}" type="datetimeFigureOut">
               <a:rPr lang="cs-CZ" smtClean="0"/>
-              <a:t>30.10.2025</a:t>
+              <a:t>08.11.2025</a:t>
             </a:fld>
             <a:endParaRPr lang="cs-CZ"/>
           </a:p>
@@ -2422,7 +2418,7 @@
           <a:p>
             <a:fld id="{92357268-C79A-4225-9F2D-63360B661E37}" type="datetimeFigureOut">
               <a:rPr lang="cs-CZ" smtClean="0"/>
-              <a:t>30.10.2025</a:t>
+              <a:t>08.11.2025</a:t>
             </a:fld>
             <a:endParaRPr lang="cs-CZ"/>
           </a:p>
@@ -2699,7 +2695,7 @@
           <a:p>
             <a:fld id="{92357268-C79A-4225-9F2D-63360B661E37}" type="datetimeFigureOut">
               <a:rPr lang="cs-CZ" smtClean="0"/>
-              <a:t>30.10.2025</a:t>
+              <a:t>08.11.2025</a:t>
             </a:fld>
             <a:endParaRPr lang="cs-CZ"/>
           </a:p>
@@ -2813,7 +2809,7 @@
             <a:fld id="{92357268-C79A-4225-9F2D-63360B661E37}" type="datetimeFigureOut">
               <a:rPr lang="cs-CZ" smtClean="0"/>
               <a:pPr/>
-              <a:t>30.10.2025</a:t>
+              <a:t>08.11.2025</a:t>
             </a:fld>
             <a:endParaRPr lang="cs-CZ"/>
           </a:p>
@@ -3245,7 +3241,7 @@
           <a:p>
             <a:fld id="{92357268-C79A-4225-9F2D-63360B661E37}" type="datetimeFigureOut">
               <a:rPr lang="cs-CZ" smtClean="0"/>
-              <a:t>30.10.2025</a:t>
+              <a:t>08.11.2025</a:t>
             </a:fld>
             <a:endParaRPr lang="cs-CZ"/>
           </a:p>
@@ -3450,7 +3446,7 @@
           <a:p>
             <a:fld id="{92357268-C79A-4225-9F2D-63360B661E37}" type="datetimeFigureOut">
               <a:rPr lang="cs-CZ" smtClean="0"/>
-              <a:t>30.10.2025</a:t>
+              <a:t>08.11.2025</a:t>
             </a:fld>
             <a:endParaRPr lang="cs-CZ"/>
           </a:p>
@@ -3623,7 +3619,7 @@
           <a:p>
             <a:fld id="{92357268-C79A-4225-9F2D-63360B661E37}" type="datetimeFigureOut">
               <a:rPr lang="cs-CZ" smtClean="0"/>
-              <a:t>30.10.2025</a:t>
+              <a:t>08.11.2025</a:t>
             </a:fld>
             <a:endParaRPr lang="cs-CZ"/>
           </a:p>
@@ -3815,7 +3811,7 @@
           <a:p>
             <a:fld id="{92357268-C79A-4225-9F2D-63360B661E37}" type="datetimeFigureOut">
               <a:rPr lang="cs-CZ" smtClean="0"/>
-              <a:t>30.10.2025</a:t>
+              <a:t>08.11.2025</a:t>
             </a:fld>
             <a:endParaRPr lang="cs-CZ"/>
           </a:p>
@@ -3909,7 +3905,7 @@
           <a:p>
             <a:fld id="{92357268-C79A-4225-9F2D-63360B661E37}" type="datetimeFigureOut">
               <a:rPr lang="cs-CZ" smtClean="0"/>
-              <a:t>30.10.2025</a:t>
+              <a:t>08.11.2025</a:t>
             </a:fld>
             <a:endParaRPr lang="cs-CZ"/>
           </a:p>
@@ -4091,7 +4087,7 @@
             <a:fld id="{92357268-C79A-4225-9F2D-63360B661E37}" type="datetimeFigureOut">
               <a:rPr lang="cs-CZ" smtClean="0"/>
               <a:pPr/>
-              <a:t>30.10.2025</a:t>
+              <a:t>08.11.2025</a:t>
             </a:fld>
             <a:endParaRPr lang="cs-CZ"/>
           </a:p>
@@ -4269,7 +4265,7 @@
           <a:p>
             <a:fld id="{92357268-C79A-4225-9F2D-63360B661E37}" type="datetimeFigureOut">
               <a:rPr lang="cs-CZ" smtClean="0"/>
-              <a:t>30.10.2025</a:t>
+              <a:t>08.11.2025</a:t>
             </a:fld>
             <a:endParaRPr lang="cs-CZ"/>
           </a:p>
@@ -4604,7 +4600,7 @@
           <a:p>
             <a:fld id="{92357268-C79A-4225-9F2D-63360B661E37}" type="datetimeFigureOut">
               <a:rPr lang="cs-CZ" smtClean="0"/>
-              <a:t>30.10.2025</a:t>
+              <a:t>08.11.2025</a:t>
             </a:fld>
             <a:endParaRPr lang="cs-CZ"/>
           </a:p>
@@ -4773,7 +4769,7 @@
           <a:p>
             <a:fld id="{F13906A7-2EE8-4435-808F-0C317E75D4DD}" type="datetime1">
               <a:rPr lang="cs-CZ" smtClean="0"/>
-              <a:t>30.10.2025</a:t>
+              <a:t>08.11.2025</a:t>
             </a:fld>
             <a:endParaRPr lang="cs-CZ"/>
           </a:p>
@@ -5037,7 +5033,7 @@
           <a:p>
             <a:fld id="{173508AB-210D-4B6F-AE53-C36D4FCB8D3D}" type="datetime1">
               <a:rPr lang="cs-CZ" smtClean="0"/>
-              <a:t>30.10.2025</a:t>
+              <a:t>08.11.2025</a:t>
             </a:fld>
             <a:endParaRPr lang="cs-CZ"/>
           </a:p>
@@ -5426,32 +5422,167 @@
           <a:chExt cx="0" cy="0"/>
         </a:xfrm>
       </p:grpSpPr>
-      <p:sp>
-        <p:nvSpPr>
-          <p:cNvPr id="2" name="Zástupný text 1">
-            <a:extLst>
-              <a:ext uri="{FF2B5EF4-FFF2-40B4-BE49-F238E27FC236}">
-                <a16:creationId xmlns:a16="http://schemas.microsoft.com/office/drawing/2014/main" id="{13701288-4DB8-515C-11B9-E81AC3D020D9}"/>
-              </a:ext>
-            </a:extLst>
-          </p:cNvPr>
-          <p:cNvSpPr>
-            <a:spLocks noGrp="1"/>
-          </p:cNvSpPr>
-          <p:nvPr>
-            <p:ph type="body" sz="quarter" idx="13"/>
-          </p:nvPr>
-        </p:nvSpPr>
-        <p:spPr/>
-        <p:txBody>
-          <a:bodyPr>
-            <a:normAutofit lnSpcReduction="10000"/>
+      <p:pic>
+        <p:nvPicPr>
+          <p:cNvPr id="4" name="Obrázek 3" descr="Obsah obrázku text, řada/pruh, diagram, snímek obrazovky&#10;&#10;Popis byl vytvořen automaticky">
+            <a:extLst>
+              <a:ext uri="{FF2B5EF4-FFF2-40B4-BE49-F238E27FC236}">
+                <a16:creationId xmlns:a16="http://schemas.microsoft.com/office/drawing/2014/main" id="{292C4C4A-CB0C-16A0-5DB1-220C99575C18}"/>
+              </a:ext>
+            </a:extLst>
+          </p:cNvPr>
+          <p:cNvPicPr>
+            <a:picLocks noChangeAspect="1"/>
+          </p:cNvPicPr>
+          <p:nvPr/>
+        </p:nvPicPr>
+        <p:blipFill>
+          <a:blip r:embed="rId3">
+            <a:extLst>
+              <a:ext uri="{28A0092B-C50C-407E-A947-70E740481C1C}">
+                <a14:useLocalDpi xmlns:a14="http://schemas.microsoft.com/office/drawing/2010/main" val="0"/>
+              </a:ext>
+            </a:extLst>
+          </a:blip>
+          <a:stretch>
+            <a:fillRect/>
+          </a:stretch>
+        </p:blipFill>
+        <p:spPr>
+          <a:xfrm>
+            <a:off x="0" y="0"/>
+            <a:ext cx="12192000" cy="6858000"/>
+          </a:xfrm>
+          <a:prstGeom prst="rect">
+            <a:avLst/>
+          </a:prstGeom>
+        </p:spPr>
+      </p:pic>
+      <p:sp>
+        <p:nvSpPr>
+          <p:cNvPr id="8" name="Obdélník 7">
+            <a:extLst>
+              <a:ext uri="{FF2B5EF4-FFF2-40B4-BE49-F238E27FC236}">
+                <a16:creationId xmlns:a16="http://schemas.microsoft.com/office/drawing/2014/main" id="{F8FC8A31-0EC7-2B91-6E58-E5895763E234}"/>
+              </a:ext>
+            </a:extLst>
+          </p:cNvPr>
+          <p:cNvSpPr/>
+          <p:nvPr/>
+        </p:nvSpPr>
+        <p:spPr>
+          <a:xfrm>
+            <a:off x="1042416" y="1103376"/>
+            <a:ext cx="944880" cy="1042416"/>
+          </a:xfrm>
+          <a:prstGeom prst="rect">
+            <a:avLst/>
+          </a:prstGeom>
+          <a:ln>
+            <a:noFill/>
+          </a:ln>
+        </p:spPr>
+        <p:style>
+          <a:lnRef idx="2">
+            <a:schemeClr val="accent1">
+              <a:shade val="15000"/>
+            </a:schemeClr>
+          </a:lnRef>
+          <a:fillRef idx="1">
+            <a:schemeClr val="accent1"/>
+          </a:fillRef>
+          <a:effectRef idx="0">
+            <a:schemeClr val="accent1"/>
+          </a:effectRef>
+          <a:fontRef idx="minor">
+            <a:schemeClr val="lt1"/>
+          </a:fontRef>
+        </p:style>
+        <p:txBody>
+          <a:bodyPr rtlCol="0" anchor="ctr"/>
+          <a:lstStyle/>
+          <a:p>
+            <a:pPr algn="ctr"/>
+            <a:endParaRPr lang="en-US"/>
+          </a:p>
+        </p:txBody>
+      </p:sp>
+      <p:sp>
+        <p:nvSpPr>
+          <p:cNvPr id="6" name="TextovéPole 5">
+            <a:extLst>
+              <a:ext uri="{FF2B5EF4-FFF2-40B4-BE49-F238E27FC236}">
+                <a16:creationId xmlns:a16="http://schemas.microsoft.com/office/drawing/2014/main" id="{C041E811-DFED-6F0C-5895-39C3E3644E1E}"/>
+              </a:ext>
+            </a:extLst>
+          </p:cNvPr>
+          <p:cNvSpPr txBox="1"/>
+          <p:nvPr/>
+        </p:nvSpPr>
+        <p:spPr>
+          <a:xfrm>
+            <a:off x="786384" y="995584"/>
+            <a:ext cx="3657600" cy="2078736"/>
+          </a:xfrm>
+          <a:prstGeom prst="rect">
+            <a:avLst/>
+          </a:prstGeom>
+        </p:spPr>
+        <p:txBody>
+          <a:bodyPr vert="horz" wrap="none" lIns="91440" tIns="45720" rIns="91440" bIns="45720" rtlCol="0" anchor="t">
+            <a:normAutofit/>
           </a:bodyPr>
           <a:lstStyle/>
           <a:p>
-            <a:r>
-              <a:rPr lang="en-US"/>
-              <a:t>Speakers Guide</a:t>
+            <a:pPr algn="ctr">
+              <a:spcBef>
+                <a:spcPts val="1200"/>
+              </a:spcBef>
+            </a:pPr>
+            <a:r>
+              <a:rPr lang="en-US" sz="4400">
+                <a:latin typeface="+mj-lt"/>
+              </a:rPr>
+              <a:t>Aptos 44 pt</a:t>
+            </a:r>
+          </a:p>
+        </p:txBody>
+      </p:sp>
+      <p:sp>
+        <p:nvSpPr>
+          <p:cNvPr id="7" name="TextovéPole 6">
+            <a:extLst>
+              <a:ext uri="{FF2B5EF4-FFF2-40B4-BE49-F238E27FC236}">
+                <a16:creationId xmlns:a16="http://schemas.microsoft.com/office/drawing/2014/main" id="{9845E01F-E129-65CE-F789-476C31120340}"/>
+              </a:ext>
+            </a:extLst>
+          </p:cNvPr>
+          <p:cNvSpPr txBox="1"/>
+          <p:nvPr/>
+        </p:nvSpPr>
+        <p:spPr>
+          <a:xfrm>
+            <a:off x="188976" y="1660640"/>
+            <a:ext cx="3657600" cy="2078736"/>
+          </a:xfrm>
+          <a:prstGeom prst="rect">
+            <a:avLst/>
+          </a:prstGeom>
+        </p:spPr>
+        <p:txBody>
+          <a:bodyPr vert="horz" wrap="none" lIns="91440" tIns="45720" rIns="91440" bIns="45720" rtlCol="0" anchor="t">
+            <a:normAutofit/>
+          </a:bodyPr>
+          <a:lstStyle/>
+          <a:p>
+            <a:pPr algn="ctr">
+              <a:spcBef>
+                <a:spcPts val="1200"/>
+              </a:spcBef>
+            </a:pPr>
+            <a:r>
+              <a:rPr lang="en-US" sz="2800"/>
+              <a:t>Aptos 25 pt</a:t>
             </a:r>
           </a:p>
         </p:txBody>
@@ -5459,7 +5590,7 @@
     </p:spTree>
     <p:extLst>
       <p:ext uri="{BB962C8B-B14F-4D97-AF65-F5344CB8AC3E}">
-        <p14:creationId xmlns:p14="http://schemas.microsoft.com/office/powerpoint/2010/main" val="2903054036"/>
+        <p14:creationId xmlns:p14="http://schemas.microsoft.com/office/powerpoint/2010/main" val="3760996607"/>
       </p:ext>
     </p:extLst>
   </p:cSld>
@@ -5470,67 +5601,6 @@
 </file>
 
 <file path=ppt/slides/slide10.xml><?xml version="1.0" encoding="utf-8"?>
-<p:sld xmlns:a="http://schemas.openxmlformats.org/drawingml/2006/main" xmlns:r="http://schemas.openxmlformats.org/officeDocument/2006/relationships" xmlns:p="http://schemas.openxmlformats.org/presentationml/2006/main">
-  <p:cSld>
-    <p:spTree>
-      <p:nvGrpSpPr>
-        <p:cNvPr id="1" name="">
-          <a:extLst>
-            <a:ext uri="{FF2B5EF4-FFF2-40B4-BE49-F238E27FC236}">
-              <a16:creationId xmlns:a16="http://schemas.microsoft.com/office/drawing/2014/main" id="{A4D1D5C1-692F-E6D3-388D-A5800F45CC82}"/>
-            </a:ext>
-          </a:extLst>
-        </p:cNvPr>
-        <p:cNvGrpSpPr/>
-        <p:nvPr/>
-      </p:nvGrpSpPr>
-      <p:grpSpPr>
-        <a:xfrm>
-          <a:off x="0" y="0"/>
-          <a:ext cx="0" cy="0"/>
-          <a:chOff x="0" y="0"/>
-          <a:chExt cx="0" cy="0"/>
-        </a:xfrm>
-      </p:grpSpPr>
-      <p:sp>
-        <p:nvSpPr>
-          <p:cNvPr id="4" name="Zástupný text 3">
-            <a:extLst>
-              <a:ext uri="{FF2B5EF4-FFF2-40B4-BE49-F238E27FC236}">
-                <a16:creationId xmlns:a16="http://schemas.microsoft.com/office/drawing/2014/main" id="{D9A50DFB-7910-BEFD-6BB3-3DFBE25C5C5E}"/>
-              </a:ext>
-            </a:extLst>
-          </p:cNvPr>
-          <p:cNvSpPr>
-            <a:spLocks noGrp="1"/>
-          </p:cNvSpPr>
-          <p:nvPr>
-            <p:ph type="body" sz="quarter" idx="14"/>
-          </p:nvPr>
-        </p:nvSpPr>
-        <p:spPr/>
-        <p:txBody>
-          <a:bodyPr/>
-          <a:lstStyle/>
-          <a:p>
-            <a:endParaRPr lang="cs-CZ"/>
-          </a:p>
-        </p:txBody>
-      </p:sp>
-    </p:spTree>
-    <p:extLst>
-      <p:ext uri="{BB962C8B-B14F-4D97-AF65-F5344CB8AC3E}">
-        <p14:creationId xmlns:p14="http://schemas.microsoft.com/office/powerpoint/2010/main" val="2390589274"/>
-      </p:ext>
-    </p:extLst>
-  </p:cSld>
-  <p:clrMapOvr>
-    <a:masterClrMapping/>
-  </p:clrMapOvr>
-</p:sld>
-</file>
-
-<file path=ppt/slides/slide11.xml><?xml version="1.0" encoding="utf-8"?>
 <p:sld xmlns:a="http://schemas.openxmlformats.org/drawingml/2006/main" xmlns:r="http://schemas.openxmlformats.org/officeDocument/2006/relationships" xmlns:p="http://schemas.openxmlformats.org/presentationml/2006/main">
   <p:cSld>
     <p:spTree>
@@ -5593,7 +5663,7 @@
 </p:sld>
 </file>
 
-<file path=ppt/slides/slide12.xml><?xml version="1.0" encoding="utf-8"?>
+<file path=ppt/slides/slide11.xml><?xml version="1.0" encoding="utf-8"?>
 <p:sld xmlns:a="http://schemas.openxmlformats.org/drawingml/2006/main" xmlns:r="http://schemas.openxmlformats.org/officeDocument/2006/relationships" xmlns:p="http://schemas.openxmlformats.org/presentationml/2006/main">
   <p:cSld>
     <p:spTree>
@@ -5612,86 +5682,6 @@
       </p:grpSpPr>
       <p:sp>
         <p:nvSpPr>
-          <p:cNvPr id="3" name="Nadpis 2">
-            <a:extLst>
-              <a:ext uri="{FF2B5EF4-FFF2-40B4-BE49-F238E27FC236}">
-                <a16:creationId xmlns:a16="http://schemas.microsoft.com/office/drawing/2014/main" id="{12933E38-7BE6-06D6-62B2-E010B23C4605}"/>
-              </a:ext>
-            </a:extLst>
-          </p:cNvPr>
-          <p:cNvSpPr>
-            <a:spLocks noGrp="1"/>
-          </p:cNvSpPr>
-          <p:nvPr>
-            <p:ph type="title"/>
-          </p:nvPr>
-        </p:nvSpPr>
-        <p:spPr/>
-        <p:txBody>
-          <a:bodyPr/>
-          <a:lstStyle/>
-          <a:p>
-            <a:endParaRPr lang="en-US"/>
-          </a:p>
-        </p:txBody>
-      </p:sp>
-      <p:sp>
-        <p:nvSpPr>
-          <p:cNvPr id="4" name="Zástupný obsah 3">
-            <a:extLst>
-              <a:ext uri="{FF2B5EF4-FFF2-40B4-BE49-F238E27FC236}">
-                <a16:creationId xmlns:a16="http://schemas.microsoft.com/office/drawing/2014/main" id="{04FB42EA-94EE-4B0A-7EC2-D7578F0A7DCF}"/>
-              </a:ext>
-            </a:extLst>
-          </p:cNvPr>
-          <p:cNvSpPr>
-            <a:spLocks noGrp="1"/>
-          </p:cNvSpPr>
-          <p:nvPr>
-            <p:ph sz="quarter" idx="13"/>
-          </p:nvPr>
-        </p:nvSpPr>
-        <p:spPr/>
-        <p:txBody>
-          <a:bodyPr/>
-          <a:lstStyle/>
-          <a:p>
-            <a:endParaRPr lang="en-US"/>
-          </a:p>
-        </p:txBody>
-      </p:sp>
-    </p:spTree>
-    <p:extLst>
-      <p:ext uri="{BB962C8B-B14F-4D97-AF65-F5344CB8AC3E}">
-        <p14:creationId xmlns:p14="http://schemas.microsoft.com/office/powerpoint/2010/main" val="3046454214"/>
-      </p:ext>
-    </p:extLst>
-  </p:cSld>
-  <p:clrMapOvr>
-    <a:masterClrMapping/>
-  </p:clrMapOvr>
-</p:sld>
-</file>
-
-<file path=ppt/slides/slide13.xml><?xml version="1.0" encoding="utf-8"?>
-<p:sld xmlns:a="http://schemas.openxmlformats.org/drawingml/2006/main" xmlns:r="http://schemas.openxmlformats.org/officeDocument/2006/relationships" xmlns:p="http://schemas.openxmlformats.org/presentationml/2006/main">
-  <p:cSld>
-    <p:spTree>
-      <p:nvGrpSpPr>
-        <p:cNvPr id="1" name=""/>
-        <p:cNvGrpSpPr/>
-        <p:nvPr/>
-      </p:nvGrpSpPr>
-      <p:grpSpPr>
-        <a:xfrm>
-          <a:off x="0" y="0"/>
-          <a:ext cx="0" cy="0"/>
-          <a:chOff x="0" y="0"/>
-          <a:chExt cx="0" cy="0"/>
-        </a:xfrm>
-      </p:grpSpPr>
-      <p:sp>
-        <p:nvSpPr>
           <p:cNvPr id="5" name="Nadpis 4">
             <a:extLst>
               <a:ext uri="{FF2B5EF4-FFF2-40B4-BE49-F238E27FC236}">
@@ -5753,7 +5743,7 @@
 </p:sld>
 </file>
 
-<file path=ppt/slides/slide14.xml><?xml version="1.0" encoding="utf-8"?>
+<file path=ppt/slides/slide12.xml><?xml version="1.0" encoding="utf-8"?>
 <p:sld xmlns:a="http://schemas.openxmlformats.org/drawingml/2006/main" xmlns:r="http://schemas.openxmlformats.org/officeDocument/2006/relationships" xmlns:p="http://schemas.openxmlformats.org/presentationml/2006/main">
   <p:cSld>
     <p:spTree>
@@ -5856,7 +5846,7 @@
 </p:sld>
 </file>
 
-<file path=ppt/slides/slide15.xml><?xml version="1.0" encoding="utf-8"?>
+<file path=ppt/slides/slide13.xml><?xml version="1.0" encoding="utf-8"?>
 <p:sld xmlns:a="http://schemas.openxmlformats.org/drawingml/2006/main" xmlns:r="http://schemas.openxmlformats.org/officeDocument/2006/relationships" xmlns:p="http://schemas.openxmlformats.org/presentationml/2006/main">
   <p:cSld>
     <p:spTree>
@@ -5942,7 +5932,7 @@
 </p:sld>
 </file>
 
-<file path=ppt/slides/slide16.xml><?xml version="1.0" encoding="utf-8"?>
+<file path=ppt/slides/slide14.xml><?xml version="1.0" encoding="utf-8"?>
 <p:sld xmlns:a="http://schemas.openxmlformats.org/drawingml/2006/main" xmlns:r="http://schemas.openxmlformats.org/officeDocument/2006/relationships" xmlns:p="http://schemas.openxmlformats.org/presentationml/2006/main">
   <p:cSld>
     <p:spTree>
@@ -5972,7 +5962,7 @@
 </p:sld>
 </file>
 
-<file path=ppt/slides/slide17.xml><?xml version="1.0" encoding="utf-8"?>
+<file path=ppt/slides/slide15.xml><?xml version="1.0" encoding="utf-8"?>
 <p:sld xmlns:a="http://schemas.openxmlformats.org/drawingml/2006/main" xmlns:r="http://schemas.openxmlformats.org/officeDocument/2006/relationships" xmlns:p="http://schemas.openxmlformats.org/presentationml/2006/main">
   <p:cSld>
     <p:spTree>
@@ -6008,7 +5998,7 @@
 </p:sld>
 </file>
 
-<file path=ppt/slides/slide18.xml><?xml version="1.0" encoding="utf-8"?>
+<file path=ppt/slides/slide16.xml><?xml version="1.0" encoding="utf-8"?>
 <p:sld xmlns:a="http://schemas.openxmlformats.org/drawingml/2006/main" xmlns:r="http://schemas.openxmlformats.org/officeDocument/2006/relationships" xmlns:p="http://schemas.openxmlformats.org/presentationml/2006/main">
   <p:cSld>
     <p:spTree>
@@ -6134,7 +6124,7 @@
                 <a:latin typeface="Prometo Medium" panose="020B0704030203060203" pitchFamily="34" charset="0"/>
               </a:rPr>
               <a:pPr/>
-              <a:t>18</a:t>
+              <a:t>16</a:t>
             </a:fld>
             <a:endParaRPr lang="cs-CZ">
               <a:latin typeface="Prometo Medium" panose="020B0704030203060203" pitchFamily="34" charset="0"/>
@@ -6155,7 +6145,7 @@
 </p:sld>
 </file>
 
-<file path=ppt/slides/slide19.xml><?xml version="1.0" encoding="utf-8"?>
+<file path=ppt/slides/slide17.xml><?xml version="1.0" encoding="utf-8"?>
 <p:sld xmlns:a="http://schemas.openxmlformats.org/drawingml/2006/main" xmlns:r="http://schemas.openxmlformats.org/officeDocument/2006/relationships" xmlns:p="http://schemas.openxmlformats.org/presentationml/2006/main">
   <p:cSld>
     <p:spTree>
@@ -6257,6 +6247,149 @@
     <p:extLst>
       <p:ext uri="{BB962C8B-B14F-4D97-AF65-F5344CB8AC3E}">
         <p14:creationId xmlns:p14="http://schemas.microsoft.com/office/powerpoint/2010/main" val="3425437108"/>
+      </p:ext>
+    </p:extLst>
+  </p:cSld>
+  <p:clrMapOvr>
+    <a:masterClrMapping/>
+  </p:clrMapOvr>
+</p:sld>
+</file>
+
+<file path=ppt/slides/slide18.xml><?xml version="1.0" encoding="utf-8"?>
+<p:sld xmlns:a="http://schemas.openxmlformats.org/drawingml/2006/main" xmlns:r="http://schemas.openxmlformats.org/officeDocument/2006/relationships" xmlns:p="http://schemas.openxmlformats.org/presentationml/2006/main">
+  <p:cSld>
+    <p:spTree>
+      <p:nvGrpSpPr>
+        <p:cNvPr id="1" name=""/>
+        <p:cNvGrpSpPr/>
+        <p:nvPr/>
+      </p:nvGrpSpPr>
+      <p:grpSpPr>
+        <a:xfrm>
+          <a:off x="0" y="0"/>
+          <a:ext cx="0" cy="0"/>
+          <a:chOff x="0" y="0"/>
+          <a:chExt cx="0" cy="0"/>
+        </a:xfrm>
+      </p:grpSpPr>
+      <p:sp>
+        <p:nvSpPr>
+          <p:cNvPr id="6" name="Nadpis 5">
+            <a:extLst>
+              <a:ext uri="{FF2B5EF4-FFF2-40B4-BE49-F238E27FC236}">
+                <a16:creationId xmlns:a16="http://schemas.microsoft.com/office/drawing/2014/main" id="{4E8F06FA-7779-CB41-6751-CE4E92F594F9}"/>
+              </a:ext>
+            </a:extLst>
+          </p:cNvPr>
+          <p:cNvSpPr>
+            <a:spLocks noGrp="1"/>
+          </p:cNvSpPr>
+          <p:nvPr>
+            <p:ph type="ctrTitle"/>
+          </p:nvPr>
+        </p:nvSpPr>
+        <p:spPr>
+          <a:xfrm>
+            <a:off x="959556" y="2395649"/>
+            <a:ext cx="5136444" cy="1944084"/>
+          </a:xfrm>
+        </p:spPr>
+        <p:txBody>
+          <a:bodyPr/>
+          <a:lstStyle/>
+          <a:p>
+            <a:endParaRPr lang="en-US">
+              <a:latin typeface="+mj-lt"/>
+            </a:endParaRPr>
+          </a:p>
+        </p:txBody>
+      </p:sp>
+      <p:sp>
+        <p:nvSpPr>
+          <p:cNvPr id="7" name="Zástupný text 6">
+            <a:extLst>
+              <a:ext uri="{FF2B5EF4-FFF2-40B4-BE49-F238E27FC236}">
+                <a16:creationId xmlns:a16="http://schemas.microsoft.com/office/drawing/2014/main" id="{333AEB48-0CCB-17D7-6903-BEA439CC58E6}"/>
+              </a:ext>
+            </a:extLst>
+          </p:cNvPr>
+          <p:cNvSpPr>
+            <a:spLocks noGrp="1"/>
+          </p:cNvSpPr>
+          <p:nvPr>
+            <p:ph type="body" sz="quarter" idx="14"/>
+          </p:nvPr>
+        </p:nvSpPr>
+        <p:spPr/>
+        <p:txBody>
+          <a:bodyPr/>
+          <a:lstStyle/>
+          <a:p>
+            <a:endParaRPr lang="en-US">
+              <a:latin typeface="+mn-lt"/>
+            </a:endParaRPr>
+          </a:p>
+        </p:txBody>
+      </p:sp>
+      <p:sp>
+        <p:nvSpPr>
+          <p:cNvPr id="8" name="Zástupný text 7">
+            <a:extLst>
+              <a:ext uri="{FF2B5EF4-FFF2-40B4-BE49-F238E27FC236}">
+                <a16:creationId xmlns:a16="http://schemas.microsoft.com/office/drawing/2014/main" id="{9B5986BB-30E1-91CE-9B7C-CD0ACD8C2F31}"/>
+              </a:ext>
+            </a:extLst>
+          </p:cNvPr>
+          <p:cNvSpPr>
+            <a:spLocks noGrp="1"/>
+          </p:cNvSpPr>
+          <p:nvPr>
+            <p:ph type="body" sz="quarter" idx="15"/>
+          </p:nvPr>
+        </p:nvSpPr>
+        <p:spPr/>
+        <p:txBody>
+          <a:bodyPr/>
+          <a:lstStyle/>
+          <a:p>
+            <a:endParaRPr lang="en-US">
+              <a:latin typeface="+mn-lt"/>
+            </a:endParaRPr>
+          </a:p>
+        </p:txBody>
+      </p:sp>
+      <p:sp>
+        <p:nvSpPr>
+          <p:cNvPr id="9" name="Zástupný text 8">
+            <a:extLst>
+              <a:ext uri="{FF2B5EF4-FFF2-40B4-BE49-F238E27FC236}">
+                <a16:creationId xmlns:a16="http://schemas.microsoft.com/office/drawing/2014/main" id="{FF06DB95-F63A-B8A8-5BF0-3EBA2DE9F6B5}"/>
+              </a:ext>
+            </a:extLst>
+          </p:cNvPr>
+          <p:cNvSpPr>
+            <a:spLocks noGrp="1"/>
+          </p:cNvSpPr>
+          <p:nvPr>
+            <p:ph type="body" sz="quarter" idx="16"/>
+          </p:nvPr>
+        </p:nvSpPr>
+        <p:spPr/>
+        <p:txBody>
+          <a:bodyPr/>
+          <a:lstStyle/>
+          <a:p>
+            <a:endParaRPr lang="en-US">
+              <a:latin typeface="+mn-lt"/>
+            </a:endParaRPr>
+          </a:p>
+        </p:txBody>
+      </p:sp>
+    </p:spTree>
+    <p:extLst>
+      <p:ext uri="{BB962C8B-B14F-4D97-AF65-F5344CB8AC3E}">
+        <p14:creationId xmlns:p14="http://schemas.microsoft.com/office/powerpoint/2010/main" val="1870391886"/>
       </p:ext>
     </p:extLst>
   </p:cSld>
@@ -6288,7 +6421,7 @@
           <p:cNvPr id="2" name="Nadpis 1">
             <a:extLst>
               <a:ext uri="{FF2B5EF4-FFF2-40B4-BE49-F238E27FC236}">
-                <a16:creationId xmlns:a16="http://schemas.microsoft.com/office/drawing/2014/main" id="{9BA04007-9192-870A-2E91-20A8BC4F03C7}"/>
+                <a16:creationId xmlns:a16="http://schemas.microsoft.com/office/drawing/2014/main" id="{DE1A7882-0A72-6E2A-FBB5-4CA51024A025}"/>
               </a:ext>
             </a:extLst>
           </p:cNvPr>
@@ -6306,7 +6439,7 @@
           <a:p>
             <a:r>
               <a:rPr lang="en-US"/>
-              <a:t>Layout Guidelines</a:t>
+              <a:t>Font Guidelines</a:t>
             </a:r>
           </a:p>
         </p:txBody>
@@ -6316,7 +6449,7 @@
           <p:cNvPr id="3" name="Zástupný text 2">
             <a:extLst>
               <a:ext uri="{FF2B5EF4-FFF2-40B4-BE49-F238E27FC236}">
-                <a16:creationId xmlns:a16="http://schemas.microsoft.com/office/drawing/2014/main" id="{8507537C-2001-2703-BAD5-7343B65B3D36}"/>
+                <a16:creationId xmlns:a16="http://schemas.microsoft.com/office/drawing/2014/main" id="{6099B819-8517-291A-4411-2BF3A74A0391}"/>
               </a:ext>
             </a:extLst>
           </p:cNvPr>
@@ -6334,19 +6467,39 @@
           <a:p>
             <a:r>
               <a:rPr lang="en-US"/>
-              <a:t>Headings, subheadings and logos in the same spot</a:t>
+              <a:t>Legible (consider room size)</a:t>
             </a:r>
           </a:p>
           <a:p>
             <a:r>
               <a:rPr lang="en-US"/>
-              <a:t>Consistency in margins, fonts, font size and colors</a:t>
+              <a:t>Generally no smaller than 24 pt (exception is footer text)</a:t>
             </a:r>
           </a:p>
           <a:p>
             <a:r>
               <a:rPr lang="en-US"/>
-              <a:t>Text and images should be placed within 95% of the slide</a:t>
+              <a:t>Standardized throughout presentation</a:t>
+            </a:r>
+          </a:p>
+          <a:p>
+            <a:r>
+              <a:rPr lang="en-US"/>
+              <a:t>Ensure enough contrast exists between background and text</a:t>
+            </a:r>
+          </a:p>
+          <a:p>
+            <a:pPr lvl="1"/>
+            <a:r>
+              <a:rPr lang="en-US"/>
+              <a:t>Reds and greens can be difficult to see for those who are color blind</a:t>
+            </a:r>
+          </a:p>
+          <a:p>
+            <a:pPr lvl="1"/>
+            <a:r>
+              <a:rPr lang="en-US"/>
+              <a:t>White on dark should not be used if audience is more than 6 m away</a:t>
             </a:r>
           </a:p>
         </p:txBody>
@@ -6354,150 +6507,7 @@
     </p:spTree>
     <p:extLst>
       <p:ext uri="{BB962C8B-B14F-4D97-AF65-F5344CB8AC3E}">
-        <p14:creationId xmlns:p14="http://schemas.microsoft.com/office/powerpoint/2010/main" val="3893280840"/>
-      </p:ext>
-    </p:extLst>
-  </p:cSld>
-  <p:clrMapOvr>
-    <a:masterClrMapping/>
-  </p:clrMapOvr>
-</p:sld>
-</file>
-
-<file path=ppt/slides/slide20.xml><?xml version="1.0" encoding="utf-8"?>
-<p:sld xmlns:a="http://schemas.openxmlformats.org/drawingml/2006/main" xmlns:r="http://schemas.openxmlformats.org/officeDocument/2006/relationships" xmlns:p="http://schemas.openxmlformats.org/presentationml/2006/main">
-  <p:cSld>
-    <p:spTree>
-      <p:nvGrpSpPr>
-        <p:cNvPr id="1" name=""/>
-        <p:cNvGrpSpPr/>
-        <p:nvPr/>
-      </p:nvGrpSpPr>
-      <p:grpSpPr>
-        <a:xfrm>
-          <a:off x="0" y="0"/>
-          <a:ext cx="0" cy="0"/>
-          <a:chOff x="0" y="0"/>
-          <a:chExt cx="0" cy="0"/>
-        </a:xfrm>
-      </p:grpSpPr>
-      <p:sp>
-        <p:nvSpPr>
-          <p:cNvPr id="6" name="Nadpis 5">
-            <a:extLst>
-              <a:ext uri="{FF2B5EF4-FFF2-40B4-BE49-F238E27FC236}">
-                <a16:creationId xmlns:a16="http://schemas.microsoft.com/office/drawing/2014/main" id="{4E8F06FA-7779-CB41-6751-CE4E92F594F9}"/>
-              </a:ext>
-            </a:extLst>
-          </p:cNvPr>
-          <p:cNvSpPr>
-            <a:spLocks noGrp="1"/>
-          </p:cNvSpPr>
-          <p:nvPr>
-            <p:ph type="ctrTitle"/>
-          </p:nvPr>
-        </p:nvSpPr>
-        <p:spPr>
-          <a:xfrm>
-            <a:off x="959556" y="2395649"/>
-            <a:ext cx="5136444" cy="1944084"/>
-          </a:xfrm>
-        </p:spPr>
-        <p:txBody>
-          <a:bodyPr/>
-          <a:lstStyle/>
-          <a:p>
-            <a:endParaRPr lang="en-US">
-              <a:latin typeface="+mj-lt"/>
-            </a:endParaRPr>
-          </a:p>
-        </p:txBody>
-      </p:sp>
-      <p:sp>
-        <p:nvSpPr>
-          <p:cNvPr id="7" name="Zástupný text 6">
-            <a:extLst>
-              <a:ext uri="{FF2B5EF4-FFF2-40B4-BE49-F238E27FC236}">
-                <a16:creationId xmlns:a16="http://schemas.microsoft.com/office/drawing/2014/main" id="{333AEB48-0CCB-17D7-6903-BEA439CC58E6}"/>
-              </a:ext>
-            </a:extLst>
-          </p:cNvPr>
-          <p:cNvSpPr>
-            <a:spLocks noGrp="1"/>
-          </p:cNvSpPr>
-          <p:nvPr>
-            <p:ph type="body" sz="quarter" idx="14"/>
-          </p:nvPr>
-        </p:nvSpPr>
-        <p:spPr/>
-        <p:txBody>
-          <a:bodyPr/>
-          <a:lstStyle/>
-          <a:p>
-            <a:endParaRPr lang="en-US">
-              <a:latin typeface="+mn-lt"/>
-            </a:endParaRPr>
-          </a:p>
-        </p:txBody>
-      </p:sp>
-      <p:sp>
-        <p:nvSpPr>
-          <p:cNvPr id="8" name="Zástupný text 7">
-            <a:extLst>
-              <a:ext uri="{FF2B5EF4-FFF2-40B4-BE49-F238E27FC236}">
-                <a16:creationId xmlns:a16="http://schemas.microsoft.com/office/drawing/2014/main" id="{9B5986BB-30E1-91CE-9B7C-CD0ACD8C2F31}"/>
-              </a:ext>
-            </a:extLst>
-          </p:cNvPr>
-          <p:cNvSpPr>
-            <a:spLocks noGrp="1"/>
-          </p:cNvSpPr>
-          <p:nvPr>
-            <p:ph type="body" sz="quarter" idx="15"/>
-          </p:nvPr>
-        </p:nvSpPr>
-        <p:spPr/>
-        <p:txBody>
-          <a:bodyPr/>
-          <a:lstStyle/>
-          <a:p>
-            <a:endParaRPr lang="en-US">
-              <a:latin typeface="+mn-lt"/>
-            </a:endParaRPr>
-          </a:p>
-        </p:txBody>
-      </p:sp>
-      <p:sp>
-        <p:nvSpPr>
-          <p:cNvPr id="9" name="Zástupný text 8">
-            <a:extLst>
-              <a:ext uri="{FF2B5EF4-FFF2-40B4-BE49-F238E27FC236}">
-                <a16:creationId xmlns:a16="http://schemas.microsoft.com/office/drawing/2014/main" id="{FF06DB95-F63A-B8A8-5BF0-3EBA2DE9F6B5}"/>
-              </a:ext>
-            </a:extLst>
-          </p:cNvPr>
-          <p:cNvSpPr>
-            <a:spLocks noGrp="1"/>
-          </p:cNvSpPr>
-          <p:nvPr>
-            <p:ph type="body" sz="quarter" idx="16"/>
-          </p:nvPr>
-        </p:nvSpPr>
-        <p:spPr/>
-        <p:txBody>
-          <a:bodyPr/>
-          <a:lstStyle/>
-          <a:p>
-            <a:endParaRPr lang="en-US">
-              <a:latin typeface="+mn-lt"/>
-            </a:endParaRPr>
-          </a:p>
-        </p:txBody>
-      </p:sp>
-    </p:spTree>
-    <p:extLst>
-      <p:ext uri="{BB962C8B-B14F-4D97-AF65-F5344CB8AC3E}">
-        <p14:creationId xmlns:p14="http://schemas.microsoft.com/office/powerpoint/2010/main" val="1870391886"/>
+        <p14:creationId xmlns:p14="http://schemas.microsoft.com/office/powerpoint/2010/main" val="4279841057"/>
       </p:ext>
     </p:extLst>
   </p:cSld>
@@ -6524,319 +6534,6 @@
           <a:chExt cx="0" cy="0"/>
         </a:xfrm>
       </p:grpSpPr>
-      <p:pic>
-        <p:nvPicPr>
-          <p:cNvPr id="4" name="Obrázek 3" descr="Obsah obrázku text, řada/pruh, diagram, snímek obrazovky&#10;&#10;Popis byl vytvořen automaticky">
-            <a:extLst>
-              <a:ext uri="{FF2B5EF4-FFF2-40B4-BE49-F238E27FC236}">
-                <a16:creationId xmlns:a16="http://schemas.microsoft.com/office/drawing/2014/main" id="{292C4C4A-CB0C-16A0-5DB1-220C99575C18}"/>
-              </a:ext>
-            </a:extLst>
-          </p:cNvPr>
-          <p:cNvPicPr>
-            <a:picLocks noChangeAspect="1"/>
-          </p:cNvPicPr>
-          <p:nvPr/>
-        </p:nvPicPr>
-        <p:blipFill>
-          <a:blip r:embed="rId3">
-            <a:extLst>
-              <a:ext uri="{28A0092B-C50C-407E-A947-70E740481C1C}">
-                <a14:useLocalDpi xmlns:a14="http://schemas.microsoft.com/office/drawing/2010/main" val="0"/>
-              </a:ext>
-            </a:extLst>
-          </a:blip>
-          <a:stretch>
-            <a:fillRect/>
-          </a:stretch>
-        </p:blipFill>
-        <p:spPr>
-          <a:xfrm>
-            <a:off x="0" y="0"/>
-            <a:ext cx="12192000" cy="6858000"/>
-          </a:xfrm>
-          <a:prstGeom prst="rect">
-            <a:avLst/>
-          </a:prstGeom>
-        </p:spPr>
-      </p:pic>
-      <p:sp>
-        <p:nvSpPr>
-          <p:cNvPr id="8" name="Obdélník 7">
-            <a:extLst>
-              <a:ext uri="{FF2B5EF4-FFF2-40B4-BE49-F238E27FC236}">
-                <a16:creationId xmlns:a16="http://schemas.microsoft.com/office/drawing/2014/main" id="{F8FC8A31-0EC7-2B91-6E58-E5895763E234}"/>
-              </a:ext>
-            </a:extLst>
-          </p:cNvPr>
-          <p:cNvSpPr/>
-          <p:nvPr/>
-        </p:nvSpPr>
-        <p:spPr>
-          <a:xfrm>
-            <a:off x="1042416" y="1103376"/>
-            <a:ext cx="944880" cy="1042416"/>
-          </a:xfrm>
-          <a:prstGeom prst="rect">
-            <a:avLst/>
-          </a:prstGeom>
-          <a:ln>
-            <a:noFill/>
-          </a:ln>
-        </p:spPr>
-        <p:style>
-          <a:lnRef idx="2">
-            <a:schemeClr val="accent1">
-              <a:shade val="15000"/>
-            </a:schemeClr>
-          </a:lnRef>
-          <a:fillRef idx="1">
-            <a:schemeClr val="accent1"/>
-          </a:fillRef>
-          <a:effectRef idx="0">
-            <a:schemeClr val="accent1"/>
-          </a:effectRef>
-          <a:fontRef idx="minor">
-            <a:schemeClr val="lt1"/>
-          </a:fontRef>
-        </p:style>
-        <p:txBody>
-          <a:bodyPr rtlCol="0" anchor="ctr"/>
-          <a:lstStyle/>
-          <a:p>
-            <a:pPr algn="ctr"/>
-            <a:endParaRPr lang="en-US"/>
-          </a:p>
-        </p:txBody>
-      </p:sp>
-      <p:sp>
-        <p:nvSpPr>
-          <p:cNvPr id="6" name="TextovéPole 5">
-            <a:extLst>
-              <a:ext uri="{FF2B5EF4-FFF2-40B4-BE49-F238E27FC236}">
-                <a16:creationId xmlns:a16="http://schemas.microsoft.com/office/drawing/2014/main" id="{C041E811-DFED-6F0C-5895-39C3E3644E1E}"/>
-              </a:ext>
-            </a:extLst>
-          </p:cNvPr>
-          <p:cNvSpPr txBox="1"/>
-          <p:nvPr/>
-        </p:nvSpPr>
-        <p:spPr>
-          <a:xfrm>
-            <a:off x="786384" y="995584"/>
-            <a:ext cx="3657600" cy="2078736"/>
-          </a:xfrm>
-          <a:prstGeom prst="rect">
-            <a:avLst/>
-          </a:prstGeom>
-        </p:spPr>
-        <p:txBody>
-          <a:bodyPr vert="horz" wrap="none" lIns="91440" tIns="45720" rIns="91440" bIns="45720" rtlCol="0" anchor="t">
-            <a:normAutofit/>
-          </a:bodyPr>
-          <a:lstStyle/>
-          <a:p>
-            <a:pPr algn="ctr">
-              <a:spcBef>
-                <a:spcPts val="1200"/>
-              </a:spcBef>
-            </a:pPr>
-            <a:r>
-              <a:rPr lang="en-US" sz="4400">
-                <a:latin typeface="+mj-lt"/>
-              </a:rPr>
-              <a:t>Aptos 44 pt</a:t>
-            </a:r>
-          </a:p>
-        </p:txBody>
-      </p:sp>
-      <p:sp>
-        <p:nvSpPr>
-          <p:cNvPr id="7" name="TextovéPole 6">
-            <a:extLst>
-              <a:ext uri="{FF2B5EF4-FFF2-40B4-BE49-F238E27FC236}">
-                <a16:creationId xmlns:a16="http://schemas.microsoft.com/office/drawing/2014/main" id="{9845E01F-E129-65CE-F789-476C31120340}"/>
-              </a:ext>
-            </a:extLst>
-          </p:cNvPr>
-          <p:cNvSpPr txBox="1"/>
-          <p:nvPr/>
-        </p:nvSpPr>
-        <p:spPr>
-          <a:xfrm>
-            <a:off x="188976" y="1660640"/>
-            <a:ext cx="3657600" cy="2078736"/>
-          </a:xfrm>
-          <a:prstGeom prst="rect">
-            <a:avLst/>
-          </a:prstGeom>
-        </p:spPr>
-        <p:txBody>
-          <a:bodyPr vert="horz" wrap="none" lIns="91440" tIns="45720" rIns="91440" bIns="45720" rtlCol="0" anchor="t">
-            <a:normAutofit/>
-          </a:bodyPr>
-          <a:lstStyle/>
-          <a:p>
-            <a:pPr algn="ctr">
-              <a:spcBef>
-                <a:spcPts val="1200"/>
-              </a:spcBef>
-            </a:pPr>
-            <a:r>
-              <a:rPr lang="en-US" sz="2800"/>
-              <a:t>Aptos 25 pt</a:t>
-            </a:r>
-          </a:p>
-        </p:txBody>
-      </p:sp>
-    </p:spTree>
-    <p:extLst>
-      <p:ext uri="{BB962C8B-B14F-4D97-AF65-F5344CB8AC3E}">
-        <p14:creationId xmlns:p14="http://schemas.microsoft.com/office/powerpoint/2010/main" val="3760996607"/>
-      </p:ext>
-    </p:extLst>
-  </p:cSld>
-  <p:clrMapOvr>
-    <a:masterClrMapping/>
-  </p:clrMapOvr>
-</p:sld>
-</file>
-
-<file path=ppt/slides/slide4.xml><?xml version="1.0" encoding="utf-8"?>
-<p:sld xmlns:a="http://schemas.openxmlformats.org/drawingml/2006/main" xmlns:r="http://schemas.openxmlformats.org/officeDocument/2006/relationships" xmlns:p="http://schemas.openxmlformats.org/presentationml/2006/main">
-  <p:cSld>
-    <p:spTree>
-      <p:nvGrpSpPr>
-        <p:cNvPr id="1" name=""/>
-        <p:cNvGrpSpPr/>
-        <p:nvPr/>
-      </p:nvGrpSpPr>
-      <p:grpSpPr>
-        <a:xfrm>
-          <a:off x="0" y="0"/>
-          <a:ext cx="0" cy="0"/>
-          <a:chOff x="0" y="0"/>
-          <a:chExt cx="0" cy="0"/>
-        </a:xfrm>
-      </p:grpSpPr>
-      <p:sp>
-        <p:nvSpPr>
-          <p:cNvPr id="2" name="Nadpis 1">
-            <a:extLst>
-              <a:ext uri="{FF2B5EF4-FFF2-40B4-BE49-F238E27FC236}">
-                <a16:creationId xmlns:a16="http://schemas.microsoft.com/office/drawing/2014/main" id="{DE1A7882-0A72-6E2A-FBB5-4CA51024A025}"/>
-              </a:ext>
-            </a:extLst>
-          </p:cNvPr>
-          <p:cNvSpPr>
-            <a:spLocks noGrp="1"/>
-          </p:cNvSpPr>
-          <p:nvPr>
-            <p:ph type="title"/>
-          </p:nvPr>
-        </p:nvSpPr>
-        <p:spPr/>
-        <p:txBody>
-          <a:bodyPr/>
-          <a:lstStyle/>
-          <a:p>
-            <a:r>
-              <a:rPr lang="en-US"/>
-              <a:t>Font Guidelines</a:t>
-            </a:r>
-          </a:p>
-        </p:txBody>
-      </p:sp>
-      <p:sp>
-        <p:nvSpPr>
-          <p:cNvPr id="3" name="Zástupný text 2">
-            <a:extLst>
-              <a:ext uri="{FF2B5EF4-FFF2-40B4-BE49-F238E27FC236}">
-                <a16:creationId xmlns:a16="http://schemas.microsoft.com/office/drawing/2014/main" id="{6099B819-8517-291A-4411-2BF3A74A0391}"/>
-              </a:ext>
-            </a:extLst>
-          </p:cNvPr>
-          <p:cNvSpPr>
-            <a:spLocks noGrp="1"/>
-          </p:cNvSpPr>
-          <p:nvPr>
-            <p:ph type="body" sz="quarter" idx="15"/>
-          </p:nvPr>
-        </p:nvSpPr>
-        <p:spPr/>
-        <p:txBody>
-          <a:bodyPr/>
-          <a:lstStyle/>
-          <a:p>
-            <a:r>
-              <a:rPr lang="en-US"/>
-              <a:t>Legible (consider room size)</a:t>
-            </a:r>
-          </a:p>
-          <a:p>
-            <a:r>
-              <a:rPr lang="en-US"/>
-              <a:t>Generally no smaller than 24 pt (exception is footer text)</a:t>
-            </a:r>
-          </a:p>
-          <a:p>
-            <a:r>
-              <a:rPr lang="en-US"/>
-              <a:t>Standardized throughout presentation</a:t>
-            </a:r>
-          </a:p>
-          <a:p>
-            <a:r>
-              <a:rPr lang="en-US"/>
-              <a:t>Ensure enough contrast exists between background and text</a:t>
-            </a:r>
-          </a:p>
-          <a:p>
-            <a:pPr lvl="1"/>
-            <a:r>
-              <a:rPr lang="en-US"/>
-              <a:t>Reds and greens can be difficult to see for those who are color blind</a:t>
-            </a:r>
-          </a:p>
-          <a:p>
-            <a:pPr lvl="1"/>
-            <a:r>
-              <a:rPr lang="en-US"/>
-              <a:t>White on dark should not be used if audience is more than 6 m away</a:t>
-            </a:r>
-          </a:p>
-        </p:txBody>
-      </p:sp>
-    </p:spTree>
-    <p:extLst>
-      <p:ext uri="{BB962C8B-B14F-4D97-AF65-F5344CB8AC3E}">
-        <p14:creationId xmlns:p14="http://schemas.microsoft.com/office/powerpoint/2010/main" val="4279841057"/>
-      </p:ext>
-    </p:extLst>
-  </p:cSld>
-  <p:clrMapOvr>
-    <a:masterClrMapping/>
-  </p:clrMapOvr>
-</p:sld>
-</file>
-
-<file path=ppt/slides/slide5.xml><?xml version="1.0" encoding="utf-8"?>
-<p:sld xmlns:a="http://schemas.openxmlformats.org/drawingml/2006/main" xmlns:r="http://schemas.openxmlformats.org/officeDocument/2006/relationships" xmlns:p="http://schemas.openxmlformats.org/presentationml/2006/main">
-  <p:cSld>
-    <p:spTree>
-      <p:nvGrpSpPr>
-        <p:cNvPr id="1" name=""/>
-        <p:cNvGrpSpPr/>
-        <p:nvPr/>
-      </p:nvGrpSpPr>
-      <p:grpSpPr>
-        <a:xfrm>
-          <a:off x="0" y="0"/>
-          <a:ext cx="0" cy="0"/>
-          <a:chOff x="0" y="0"/>
-          <a:chExt cx="0" cy="0"/>
-        </a:xfrm>
-      </p:grpSpPr>
       <p:sp>
         <p:nvSpPr>
           <p:cNvPr id="2" name="Nadpis 1">
@@ -6920,7 +6617,7 @@
 </p:sld>
 </file>
 
-<file path=ppt/slides/slide6.xml><?xml version="1.0" encoding="utf-8"?>
+<file path=ppt/slides/slide4.xml><?xml version="1.0" encoding="utf-8"?>
 <p:sld xmlns:a="http://schemas.openxmlformats.org/drawingml/2006/main" xmlns:r="http://schemas.openxmlformats.org/officeDocument/2006/relationships" xmlns:p="http://schemas.openxmlformats.org/presentationml/2006/main">
   <p:cSld>
     <p:spTree>
@@ -7383,7 +7080,7 @@
 </p:sld>
 </file>
 
-<file path=ppt/slides/slide7.xml><?xml version="1.0" encoding="utf-8"?>
+<file path=ppt/slides/slide5.xml><?xml version="1.0" encoding="utf-8"?>
 <p:sld xmlns:a="http://schemas.openxmlformats.org/drawingml/2006/main" xmlns:r="http://schemas.openxmlformats.org/officeDocument/2006/relationships" xmlns:p="http://schemas.openxmlformats.org/presentationml/2006/main">
   <p:cSld>
     <p:spTree>
@@ -7997,6 +7694,698 @@
     <p:extLst>
       <p:ext uri="{BB962C8B-B14F-4D97-AF65-F5344CB8AC3E}">
         <p14:creationId xmlns:p14="http://schemas.microsoft.com/office/powerpoint/2010/main" val="617504360"/>
+      </p:ext>
+    </p:extLst>
+  </p:cSld>
+  <p:clrMapOvr>
+    <a:masterClrMapping/>
+  </p:clrMapOvr>
+</p:sld>
+</file>
+
+<file path=ppt/slides/slide6.xml><?xml version="1.0" encoding="utf-8"?>
+<p:sld xmlns:a="http://schemas.openxmlformats.org/drawingml/2006/main" xmlns:r="http://schemas.openxmlformats.org/officeDocument/2006/relationships" xmlns:p="http://schemas.openxmlformats.org/presentationml/2006/main">
+  <p:cSld>
+    <p:spTree>
+      <p:nvGrpSpPr>
+        <p:cNvPr id="1" name=""/>
+        <p:cNvGrpSpPr/>
+        <p:nvPr/>
+      </p:nvGrpSpPr>
+      <p:grpSpPr>
+        <a:xfrm>
+          <a:off x="0" y="0"/>
+          <a:ext cx="0" cy="0"/>
+          <a:chOff x="0" y="0"/>
+          <a:chExt cx="0" cy="0"/>
+        </a:xfrm>
+      </p:grpSpPr>
+      <p:sp>
+        <p:nvSpPr>
+          <p:cNvPr id="15" name="Nadpis 14">
+            <a:extLst>
+              <a:ext uri="{FF2B5EF4-FFF2-40B4-BE49-F238E27FC236}">
+                <a16:creationId xmlns:a16="http://schemas.microsoft.com/office/drawing/2014/main" id="{E390D7A5-0B4D-9FA2-299F-55B8ED8D6D1A}"/>
+              </a:ext>
+            </a:extLst>
+          </p:cNvPr>
+          <p:cNvSpPr>
+            <a:spLocks noGrp="1"/>
+          </p:cNvSpPr>
+          <p:nvPr>
+            <p:ph type="ctrTitle"/>
+          </p:nvPr>
+        </p:nvSpPr>
+        <p:spPr>
+          <a:xfrm>
+            <a:off x="838200" y="2195020"/>
+            <a:ext cx="5939672" cy="838233"/>
+          </a:xfrm>
+        </p:spPr>
+        <p:txBody>
+          <a:bodyPr/>
+          <a:lstStyle/>
+          <a:p>
+            <a:r>
+              <a:rPr lang="cs-CZ" dirty="0"/>
+              <a:t>Artificial Intelligence</a:t>
+            </a:r>
+          </a:p>
+        </p:txBody>
+      </p:sp>
+      <p:sp>
+        <p:nvSpPr>
+          <p:cNvPr id="16" name="Zástupný text 15">
+            <a:extLst>
+              <a:ext uri="{FF2B5EF4-FFF2-40B4-BE49-F238E27FC236}">
+                <a16:creationId xmlns:a16="http://schemas.microsoft.com/office/drawing/2014/main" id="{EAC5759F-4655-07F9-56AA-7867A39DB3CF}"/>
+              </a:ext>
+            </a:extLst>
+          </p:cNvPr>
+          <p:cNvSpPr>
+            <a:spLocks noGrp="1"/>
+          </p:cNvSpPr>
+          <p:nvPr>
+            <p:ph type="body" sz="quarter" idx="15"/>
+          </p:nvPr>
+        </p:nvSpPr>
+        <p:spPr>
+          <a:xfrm>
+            <a:off x="838200" y="5334226"/>
+            <a:ext cx="2429726" cy="838233"/>
+          </a:xfrm>
+        </p:spPr>
+        <p:txBody>
+          <a:bodyPr/>
+          <a:lstStyle/>
+          <a:p>
+            <a:r>
+              <a:rPr lang="cs-CZ" dirty="0"/>
+              <a:t>.NET Developer Microsoft MCT</a:t>
+            </a:r>
+          </a:p>
+        </p:txBody>
+      </p:sp>
+      <p:sp>
+        <p:nvSpPr>
+          <p:cNvPr id="17" name="Zástupný text 16">
+            <a:extLst>
+              <a:ext uri="{FF2B5EF4-FFF2-40B4-BE49-F238E27FC236}">
+                <a16:creationId xmlns:a16="http://schemas.microsoft.com/office/drawing/2014/main" id="{1C98B004-3A98-773F-6A8B-7B23E8E6E824}"/>
+              </a:ext>
+            </a:extLst>
+          </p:cNvPr>
+          <p:cNvSpPr>
+            <a:spLocks noGrp="1"/>
+          </p:cNvSpPr>
+          <p:nvPr>
+            <p:ph type="body" sz="quarter" idx="18"/>
+          </p:nvPr>
+        </p:nvSpPr>
+        <p:spPr/>
+        <p:txBody>
+          <a:bodyPr/>
+          <a:lstStyle/>
+          <a:p>
+            <a:r>
+              <a:rPr lang="cs-CZ" dirty="0"/>
+              <a:t>for .NET Developers</a:t>
+            </a:r>
+          </a:p>
+        </p:txBody>
+      </p:sp>
+      <p:sp>
+        <p:nvSpPr>
+          <p:cNvPr id="19" name="Zástupný text 18">
+            <a:extLst>
+              <a:ext uri="{FF2B5EF4-FFF2-40B4-BE49-F238E27FC236}">
+                <a16:creationId xmlns:a16="http://schemas.microsoft.com/office/drawing/2014/main" id="{531531D6-3522-A791-B991-335662165F3F}"/>
+              </a:ext>
+            </a:extLst>
+          </p:cNvPr>
+          <p:cNvSpPr>
+            <a:spLocks noGrp="1"/>
+          </p:cNvSpPr>
+          <p:nvPr>
+            <p:ph type="body" sz="quarter" idx="14"/>
+          </p:nvPr>
+        </p:nvSpPr>
+        <p:spPr>
+          <a:xfrm>
+            <a:off x="841376" y="4764898"/>
+            <a:ext cx="2429726" cy="488140"/>
+          </a:xfrm>
+        </p:spPr>
+        <p:txBody>
+          <a:bodyPr/>
+          <a:lstStyle/>
+          <a:p>
+            <a:r>
+              <a:rPr lang="cs-CZ" dirty="0"/>
+              <a:t>Dariusz Kacban</a:t>
+            </a:r>
+          </a:p>
+        </p:txBody>
+      </p:sp>
+      <p:sp>
+        <p:nvSpPr>
+          <p:cNvPr id="4" name="Zástupný text 15">
+            <a:extLst>
+              <a:ext uri="{FF2B5EF4-FFF2-40B4-BE49-F238E27FC236}">
+                <a16:creationId xmlns:a16="http://schemas.microsoft.com/office/drawing/2014/main" id="{30E5371C-9E44-BD0E-A471-78F4DADC1055}"/>
+              </a:ext>
+            </a:extLst>
+          </p:cNvPr>
+          <p:cNvSpPr txBox="1">
+            <a:spLocks/>
+          </p:cNvSpPr>
+          <p:nvPr/>
+        </p:nvSpPr>
+        <p:spPr>
+          <a:xfrm>
+            <a:off x="3666274" y="5323454"/>
+            <a:ext cx="2429726" cy="838233"/>
+          </a:xfrm>
+          <a:prstGeom prst="rect">
+            <a:avLst/>
+          </a:prstGeom>
+        </p:spPr>
+        <p:txBody>
+          <a:bodyPr vert="horz" lIns="91440" tIns="45720" rIns="91440" bIns="45720" rtlCol="0" anchor="t">
+            <a:normAutofit/>
+          </a:bodyPr>
+          <a:lstStyle>
+            <a:lvl1pPr marL="0" indent="0" algn="l" defTabSz="914400" rtl="0" eaLnBrk="1" latinLnBrk="0" hangingPunct="1">
+              <a:lnSpc>
+                <a:spcPct val="90000"/>
+              </a:lnSpc>
+              <a:spcBef>
+                <a:spcPts val="1000"/>
+              </a:spcBef>
+              <a:buClr>
+                <a:srgbClr val="FDAD00"/>
+              </a:buClr>
+              <a:buFont typeface="Arial" panose="020B0604020202020204" pitchFamily="34" charset="0"/>
+              <a:buNone/>
+              <a:defRPr sz="2000" kern="1200">
+                <a:solidFill>
+                  <a:schemeClr val="bg1">
+                    <a:lumMod val="85000"/>
+                  </a:schemeClr>
+                </a:solidFill>
+                <a:latin typeface="+mn-lt"/>
+                <a:ea typeface="+mn-ea"/>
+                <a:cs typeface="+mn-cs"/>
+              </a:defRPr>
+            </a:lvl1pPr>
+            <a:lvl2pPr marL="685800" indent="-228600" algn="l" defTabSz="914400" rtl="0" eaLnBrk="1" latinLnBrk="0" hangingPunct="1">
+              <a:lnSpc>
+                <a:spcPct val="90000"/>
+              </a:lnSpc>
+              <a:spcBef>
+                <a:spcPts val="500"/>
+              </a:spcBef>
+              <a:buClr>
+                <a:srgbClr val="FDAD00"/>
+              </a:buClr>
+              <a:buFont typeface="Arial" panose="020B0604020202020204" pitchFamily="34" charset="0"/>
+              <a:buChar char="•"/>
+              <a:defRPr sz="2400" kern="1200">
+                <a:solidFill>
+                  <a:schemeClr val="tx1"/>
+                </a:solidFill>
+                <a:latin typeface="+mn-lt"/>
+                <a:ea typeface="+mn-ea"/>
+                <a:cs typeface="+mn-cs"/>
+              </a:defRPr>
+            </a:lvl2pPr>
+            <a:lvl3pPr marL="1143000" indent="-228600" algn="l" defTabSz="914400" rtl="0" eaLnBrk="1" latinLnBrk="0" hangingPunct="1">
+              <a:lnSpc>
+                <a:spcPct val="90000"/>
+              </a:lnSpc>
+              <a:spcBef>
+                <a:spcPts val="500"/>
+              </a:spcBef>
+              <a:buClr>
+                <a:srgbClr val="FDAD00"/>
+              </a:buClr>
+              <a:buFont typeface="Arial" panose="020B0604020202020204" pitchFamily="34" charset="0"/>
+              <a:buChar char="•"/>
+              <a:defRPr sz="2000" kern="1200">
+                <a:solidFill>
+                  <a:schemeClr val="tx1"/>
+                </a:solidFill>
+                <a:latin typeface="+mn-lt"/>
+                <a:ea typeface="+mn-ea"/>
+                <a:cs typeface="+mn-cs"/>
+              </a:defRPr>
+            </a:lvl3pPr>
+            <a:lvl4pPr marL="1600200" indent="-228600" algn="l" defTabSz="914400" rtl="0" eaLnBrk="1" latinLnBrk="0" hangingPunct="1">
+              <a:lnSpc>
+                <a:spcPct val="90000"/>
+              </a:lnSpc>
+              <a:spcBef>
+                <a:spcPts val="500"/>
+              </a:spcBef>
+              <a:buClr>
+                <a:srgbClr val="FDAD00"/>
+              </a:buClr>
+              <a:buFont typeface="Arial" panose="020B0604020202020204" pitchFamily="34" charset="0"/>
+              <a:buChar char="•"/>
+              <a:defRPr sz="1800" kern="1200">
+                <a:solidFill>
+                  <a:schemeClr val="tx1"/>
+                </a:solidFill>
+                <a:latin typeface="+mn-lt"/>
+                <a:ea typeface="+mn-ea"/>
+                <a:cs typeface="+mn-cs"/>
+              </a:defRPr>
+            </a:lvl4pPr>
+            <a:lvl5pPr marL="2057400" indent="-228600" algn="l" defTabSz="914400" rtl="0" eaLnBrk="1" latinLnBrk="0" hangingPunct="1">
+              <a:lnSpc>
+                <a:spcPct val="90000"/>
+              </a:lnSpc>
+              <a:spcBef>
+                <a:spcPts val="500"/>
+              </a:spcBef>
+              <a:buClr>
+                <a:srgbClr val="FDAD00"/>
+              </a:buClr>
+              <a:buFont typeface="Arial" panose="020B0604020202020204" pitchFamily="34" charset="0"/>
+              <a:buChar char="•"/>
+              <a:defRPr sz="1800" kern="1200">
+                <a:solidFill>
+                  <a:schemeClr val="tx1"/>
+                </a:solidFill>
+                <a:latin typeface="+mn-lt"/>
+                <a:ea typeface="+mn-ea"/>
+                <a:cs typeface="+mn-cs"/>
+              </a:defRPr>
+            </a:lvl5pPr>
+            <a:lvl6pPr marL="2514600" indent="-228600" algn="l" defTabSz="914400" rtl="0" eaLnBrk="1" latinLnBrk="0" hangingPunct="1">
+              <a:lnSpc>
+                <a:spcPct val="90000"/>
+              </a:lnSpc>
+              <a:spcBef>
+                <a:spcPts val="500"/>
+              </a:spcBef>
+              <a:buFont typeface="Arial" panose="020B0604020202020204" pitchFamily="34" charset="0"/>
+              <a:buChar char="•"/>
+              <a:defRPr sz="1800" kern="1200">
+                <a:solidFill>
+                  <a:schemeClr val="tx1"/>
+                </a:solidFill>
+                <a:latin typeface="+mn-lt"/>
+                <a:ea typeface="+mn-ea"/>
+                <a:cs typeface="+mn-cs"/>
+              </a:defRPr>
+            </a:lvl6pPr>
+            <a:lvl7pPr marL="2971800" indent="-228600" algn="l" defTabSz="914400" rtl="0" eaLnBrk="1" latinLnBrk="0" hangingPunct="1">
+              <a:lnSpc>
+                <a:spcPct val="90000"/>
+              </a:lnSpc>
+              <a:spcBef>
+                <a:spcPts val="500"/>
+              </a:spcBef>
+              <a:buFont typeface="Arial" panose="020B0604020202020204" pitchFamily="34" charset="0"/>
+              <a:buChar char="•"/>
+              <a:defRPr sz="1800" kern="1200">
+                <a:solidFill>
+                  <a:schemeClr val="tx1"/>
+                </a:solidFill>
+                <a:latin typeface="+mn-lt"/>
+                <a:ea typeface="+mn-ea"/>
+                <a:cs typeface="+mn-cs"/>
+              </a:defRPr>
+            </a:lvl7pPr>
+            <a:lvl8pPr marL="3429000" indent="-228600" algn="l" defTabSz="914400" rtl="0" eaLnBrk="1" latinLnBrk="0" hangingPunct="1">
+              <a:lnSpc>
+                <a:spcPct val="90000"/>
+              </a:lnSpc>
+              <a:spcBef>
+                <a:spcPts val="500"/>
+              </a:spcBef>
+              <a:buFont typeface="Arial" panose="020B0604020202020204" pitchFamily="34" charset="0"/>
+              <a:buChar char="•"/>
+              <a:defRPr sz="1800" kern="1200">
+                <a:solidFill>
+                  <a:schemeClr val="tx1"/>
+                </a:solidFill>
+                <a:latin typeface="+mn-lt"/>
+                <a:ea typeface="+mn-ea"/>
+                <a:cs typeface="+mn-cs"/>
+              </a:defRPr>
+            </a:lvl8pPr>
+            <a:lvl9pPr marL="3886200" indent="-228600" algn="l" defTabSz="914400" rtl="0" eaLnBrk="1" latinLnBrk="0" hangingPunct="1">
+              <a:lnSpc>
+                <a:spcPct val="90000"/>
+              </a:lnSpc>
+              <a:spcBef>
+                <a:spcPts val="500"/>
+              </a:spcBef>
+              <a:buFont typeface="Arial" panose="020B0604020202020204" pitchFamily="34" charset="0"/>
+              <a:buChar char="•"/>
+              <a:defRPr sz="1800" kern="1200">
+                <a:solidFill>
+                  <a:schemeClr val="tx1"/>
+                </a:solidFill>
+                <a:latin typeface="+mn-lt"/>
+                <a:ea typeface="+mn-ea"/>
+                <a:cs typeface="+mn-cs"/>
+              </a:defRPr>
+            </a:lvl9pPr>
+          </a:lstStyle>
+          <a:p>
+            <a:r>
+              <a:rPr lang="cs-CZ" dirty="0"/>
+              <a:t>.NET Developer Microsoft MVP</a:t>
+            </a:r>
+          </a:p>
+        </p:txBody>
+      </p:sp>
+      <p:sp>
+        <p:nvSpPr>
+          <p:cNvPr id="5" name="Zástupný text 18">
+            <a:extLst>
+              <a:ext uri="{FF2B5EF4-FFF2-40B4-BE49-F238E27FC236}">
+                <a16:creationId xmlns:a16="http://schemas.microsoft.com/office/drawing/2014/main" id="{F0B3F289-A280-D185-DC02-2862D1A43AFA}"/>
+              </a:ext>
+            </a:extLst>
+          </p:cNvPr>
+          <p:cNvSpPr txBox="1">
+            <a:spLocks/>
+          </p:cNvSpPr>
+          <p:nvPr/>
+        </p:nvSpPr>
+        <p:spPr>
+          <a:xfrm>
+            <a:off x="3644244" y="4805940"/>
+            <a:ext cx="2897957" cy="488140"/>
+          </a:xfrm>
+          <a:prstGeom prst="rect">
+            <a:avLst/>
+          </a:prstGeom>
+        </p:spPr>
+        <p:txBody>
+          <a:bodyPr vert="horz" lIns="91440" tIns="45720" rIns="91440" bIns="45720" rtlCol="0" anchor="ctr">
+            <a:normAutofit/>
+          </a:bodyPr>
+          <a:lstStyle>
+            <a:lvl1pPr marL="0" indent="0" algn="l" defTabSz="914400" rtl="0" eaLnBrk="1" latinLnBrk="0" hangingPunct="1">
+              <a:lnSpc>
+                <a:spcPct val="90000"/>
+              </a:lnSpc>
+              <a:spcBef>
+                <a:spcPts val="1000"/>
+              </a:spcBef>
+              <a:buClr>
+                <a:srgbClr val="FDAD00"/>
+              </a:buClr>
+              <a:buFont typeface="Arial" panose="020B0604020202020204" pitchFamily="34" charset="0"/>
+              <a:buNone/>
+              <a:defRPr sz="2400" kern="1200">
+                <a:solidFill>
+                  <a:srgbClr val="FDAD00"/>
+                </a:solidFill>
+                <a:latin typeface="+mj-lt"/>
+                <a:ea typeface="+mn-ea"/>
+                <a:cs typeface="+mn-cs"/>
+              </a:defRPr>
+            </a:lvl1pPr>
+            <a:lvl2pPr marL="685800" indent="-228600" algn="l" defTabSz="914400" rtl="0" eaLnBrk="1" latinLnBrk="0" hangingPunct="1">
+              <a:lnSpc>
+                <a:spcPct val="90000"/>
+              </a:lnSpc>
+              <a:spcBef>
+                <a:spcPts val="500"/>
+              </a:spcBef>
+              <a:buClr>
+                <a:srgbClr val="FDAD00"/>
+              </a:buClr>
+              <a:buFont typeface="Arial" panose="020B0604020202020204" pitchFamily="34" charset="0"/>
+              <a:buChar char="•"/>
+              <a:defRPr sz="2400" kern="1200">
+                <a:solidFill>
+                  <a:schemeClr val="tx1"/>
+                </a:solidFill>
+                <a:latin typeface="+mn-lt"/>
+                <a:ea typeface="+mn-ea"/>
+                <a:cs typeface="+mn-cs"/>
+              </a:defRPr>
+            </a:lvl2pPr>
+            <a:lvl3pPr marL="1143000" indent="-228600" algn="l" defTabSz="914400" rtl="0" eaLnBrk="1" latinLnBrk="0" hangingPunct="1">
+              <a:lnSpc>
+                <a:spcPct val="90000"/>
+              </a:lnSpc>
+              <a:spcBef>
+                <a:spcPts val="500"/>
+              </a:spcBef>
+              <a:buClr>
+                <a:srgbClr val="FDAD00"/>
+              </a:buClr>
+              <a:buFont typeface="Arial" panose="020B0604020202020204" pitchFamily="34" charset="0"/>
+              <a:buChar char="•"/>
+              <a:defRPr sz="2000" kern="1200">
+                <a:solidFill>
+                  <a:schemeClr val="tx1"/>
+                </a:solidFill>
+                <a:latin typeface="+mn-lt"/>
+                <a:ea typeface="+mn-ea"/>
+                <a:cs typeface="+mn-cs"/>
+              </a:defRPr>
+            </a:lvl3pPr>
+            <a:lvl4pPr marL="1600200" indent="-228600" algn="l" defTabSz="914400" rtl="0" eaLnBrk="1" latinLnBrk="0" hangingPunct="1">
+              <a:lnSpc>
+                <a:spcPct val="90000"/>
+              </a:lnSpc>
+              <a:spcBef>
+                <a:spcPts val="500"/>
+              </a:spcBef>
+              <a:buClr>
+                <a:srgbClr val="FDAD00"/>
+              </a:buClr>
+              <a:buFont typeface="Arial" panose="020B0604020202020204" pitchFamily="34" charset="0"/>
+              <a:buChar char="•"/>
+              <a:defRPr sz="1800" kern="1200">
+                <a:solidFill>
+                  <a:schemeClr val="tx1"/>
+                </a:solidFill>
+                <a:latin typeface="+mn-lt"/>
+                <a:ea typeface="+mn-ea"/>
+                <a:cs typeface="+mn-cs"/>
+              </a:defRPr>
+            </a:lvl4pPr>
+            <a:lvl5pPr marL="2057400" indent="-228600" algn="l" defTabSz="914400" rtl="0" eaLnBrk="1" latinLnBrk="0" hangingPunct="1">
+              <a:lnSpc>
+                <a:spcPct val="90000"/>
+              </a:lnSpc>
+              <a:spcBef>
+                <a:spcPts val="500"/>
+              </a:spcBef>
+              <a:buClr>
+                <a:srgbClr val="FDAD00"/>
+              </a:buClr>
+              <a:buFont typeface="Arial" panose="020B0604020202020204" pitchFamily="34" charset="0"/>
+              <a:buChar char="•"/>
+              <a:defRPr sz="1800" kern="1200">
+                <a:solidFill>
+                  <a:schemeClr val="tx1"/>
+                </a:solidFill>
+                <a:latin typeface="+mn-lt"/>
+                <a:ea typeface="+mn-ea"/>
+                <a:cs typeface="+mn-cs"/>
+              </a:defRPr>
+            </a:lvl5pPr>
+            <a:lvl6pPr marL="2514600" indent="-228600" algn="l" defTabSz="914400" rtl="0" eaLnBrk="1" latinLnBrk="0" hangingPunct="1">
+              <a:lnSpc>
+                <a:spcPct val="90000"/>
+              </a:lnSpc>
+              <a:spcBef>
+                <a:spcPts val="500"/>
+              </a:spcBef>
+              <a:buFont typeface="Arial" panose="020B0604020202020204" pitchFamily="34" charset="0"/>
+              <a:buChar char="•"/>
+              <a:defRPr sz="1800" kern="1200">
+                <a:solidFill>
+                  <a:schemeClr val="tx1"/>
+                </a:solidFill>
+                <a:latin typeface="+mn-lt"/>
+                <a:ea typeface="+mn-ea"/>
+                <a:cs typeface="+mn-cs"/>
+              </a:defRPr>
+            </a:lvl6pPr>
+            <a:lvl7pPr marL="2971800" indent="-228600" algn="l" defTabSz="914400" rtl="0" eaLnBrk="1" latinLnBrk="0" hangingPunct="1">
+              <a:lnSpc>
+                <a:spcPct val="90000"/>
+              </a:lnSpc>
+              <a:spcBef>
+                <a:spcPts val="500"/>
+              </a:spcBef>
+              <a:buFont typeface="Arial" panose="020B0604020202020204" pitchFamily="34" charset="0"/>
+              <a:buChar char="•"/>
+              <a:defRPr sz="1800" kern="1200">
+                <a:solidFill>
+                  <a:schemeClr val="tx1"/>
+                </a:solidFill>
+                <a:latin typeface="+mn-lt"/>
+                <a:ea typeface="+mn-ea"/>
+                <a:cs typeface="+mn-cs"/>
+              </a:defRPr>
+            </a:lvl7pPr>
+            <a:lvl8pPr marL="3429000" indent="-228600" algn="l" defTabSz="914400" rtl="0" eaLnBrk="1" latinLnBrk="0" hangingPunct="1">
+              <a:lnSpc>
+                <a:spcPct val="90000"/>
+              </a:lnSpc>
+              <a:spcBef>
+                <a:spcPts val="500"/>
+              </a:spcBef>
+              <a:buFont typeface="Arial" panose="020B0604020202020204" pitchFamily="34" charset="0"/>
+              <a:buChar char="•"/>
+              <a:defRPr sz="1800" kern="1200">
+                <a:solidFill>
+                  <a:schemeClr val="tx1"/>
+                </a:solidFill>
+                <a:latin typeface="+mn-lt"/>
+                <a:ea typeface="+mn-ea"/>
+                <a:cs typeface="+mn-cs"/>
+              </a:defRPr>
+            </a:lvl8pPr>
+            <a:lvl9pPr marL="3886200" indent="-228600" algn="l" defTabSz="914400" rtl="0" eaLnBrk="1" latinLnBrk="0" hangingPunct="1">
+              <a:lnSpc>
+                <a:spcPct val="90000"/>
+              </a:lnSpc>
+              <a:spcBef>
+                <a:spcPts val="500"/>
+              </a:spcBef>
+              <a:buFont typeface="Arial" panose="020B0604020202020204" pitchFamily="34" charset="0"/>
+              <a:buChar char="•"/>
+              <a:defRPr sz="1800" kern="1200">
+                <a:solidFill>
+                  <a:schemeClr val="tx1"/>
+                </a:solidFill>
+                <a:latin typeface="+mn-lt"/>
+                <a:ea typeface="+mn-ea"/>
+                <a:cs typeface="+mn-cs"/>
+              </a:defRPr>
+            </a:lvl9pPr>
+          </a:lstStyle>
+          <a:p>
+            <a:r>
+              <a:rPr lang="cs-CZ" dirty="0"/>
+              <a:t>Kajetan Duszyński</a:t>
+            </a:r>
+          </a:p>
+        </p:txBody>
+      </p:sp>
+    </p:spTree>
+    <p:extLst>
+      <p:ext uri="{BB962C8B-B14F-4D97-AF65-F5344CB8AC3E}">
+        <p14:creationId xmlns:p14="http://schemas.microsoft.com/office/powerpoint/2010/main" val="2743714645"/>
+      </p:ext>
+    </p:extLst>
+  </p:cSld>
+  <p:clrMapOvr>
+    <a:masterClrMapping/>
+  </p:clrMapOvr>
+</p:sld>
+</file>
+
+<file path=ppt/slides/slide7.xml><?xml version="1.0" encoding="utf-8"?>
+<p:sld xmlns:a="http://schemas.openxmlformats.org/drawingml/2006/main" xmlns:r="http://schemas.openxmlformats.org/officeDocument/2006/relationships" xmlns:p="http://schemas.openxmlformats.org/presentationml/2006/main">
+  <p:cSld>
+    <p:spTree>
+      <p:nvGrpSpPr>
+        <p:cNvPr id="1" name=""/>
+        <p:cNvGrpSpPr/>
+        <p:nvPr/>
+      </p:nvGrpSpPr>
+      <p:grpSpPr>
+        <a:xfrm>
+          <a:off x="0" y="0"/>
+          <a:ext cx="0" cy="0"/>
+          <a:chOff x="0" y="0"/>
+          <a:chExt cx="0" cy="0"/>
+        </a:xfrm>
+      </p:grpSpPr>
+      <p:sp>
+        <p:nvSpPr>
+          <p:cNvPr id="3" name="Nadpis 2">
+            <a:extLst>
+              <a:ext uri="{FF2B5EF4-FFF2-40B4-BE49-F238E27FC236}">
+                <a16:creationId xmlns:a16="http://schemas.microsoft.com/office/drawing/2014/main" id="{12933E38-7BE6-06D6-62B2-E010B23C4605}"/>
+              </a:ext>
+            </a:extLst>
+          </p:cNvPr>
+          <p:cNvSpPr>
+            <a:spLocks noGrp="1"/>
+          </p:cNvSpPr>
+          <p:nvPr>
+            <p:ph type="title"/>
+          </p:nvPr>
+        </p:nvSpPr>
+        <p:spPr/>
+        <p:txBody>
+          <a:bodyPr/>
+          <a:lstStyle/>
+          <a:p>
+            <a:r>
+              <a:rPr lang="pl-PL" dirty="0"/>
+              <a:t>Agenda</a:t>
+            </a:r>
+            <a:endParaRPr lang="en-US" dirty="0"/>
+          </a:p>
+        </p:txBody>
+      </p:sp>
+      <p:sp>
+        <p:nvSpPr>
+          <p:cNvPr id="4" name="Zástupný obsah 3">
+            <a:extLst>
+              <a:ext uri="{FF2B5EF4-FFF2-40B4-BE49-F238E27FC236}">
+                <a16:creationId xmlns:a16="http://schemas.microsoft.com/office/drawing/2014/main" id="{04FB42EA-94EE-4B0A-7EC2-D7578F0A7DCF}"/>
+              </a:ext>
+            </a:extLst>
+          </p:cNvPr>
+          <p:cNvSpPr>
+            <a:spLocks noGrp="1"/>
+          </p:cNvSpPr>
+          <p:nvPr>
+            <p:ph sz="quarter" idx="13"/>
+          </p:nvPr>
+        </p:nvSpPr>
+        <p:spPr/>
+        <p:txBody>
+          <a:bodyPr/>
+          <a:lstStyle/>
+          <a:p>
+            <a:r>
+              <a:rPr lang="pl-PL" dirty="0"/>
+              <a:t>Module 1 - Basic</a:t>
+            </a:r>
+          </a:p>
+          <a:p>
+            <a:r>
+              <a:rPr lang="pl-PL" dirty="0"/>
+              <a:t>Module 2 – </a:t>
+            </a:r>
+            <a:r>
+              <a:rPr lang="pl-PL" dirty="0" err="1"/>
+              <a:t>Intermediate</a:t>
+            </a:r>
+            <a:endParaRPr lang="pl-PL" dirty="0"/>
+          </a:p>
+          <a:p>
+            <a:r>
+              <a:rPr lang="pl-PL" dirty="0"/>
+              <a:t>Module 3 - Advanced</a:t>
+            </a:r>
+            <a:endParaRPr lang="en-US" dirty="0"/>
+          </a:p>
+        </p:txBody>
+      </p:sp>
+    </p:spTree>
+    <p:extLst>
+      <p:ext uri="{BB962C8B-B14F-4D97-AF65-F5344CB8AC3E}">
+        <p14:creationId xmlns:p14="http://schemas.microsoft.com/office/powerpoint/2010/main" val="3046454214"/>
       </p:ext>
     </p:extLst>
   </p:cSld>
@@ -8025,98 +8414,25 @@
       </p:grpSpPr>
       <p:sp>
         <p:nvSpPr>
-          <p:cNvPr id="15" name="Nadpis 14">
-            <a:extLst>
-              <a:ext uri="{FF2B5EF4-FFF2-40B4-BE49-F238E27FC236}">
-                <a16:creationId xmlns:a16="http://schemas.microsoft.com/office/drawing/2014/main" id="{E390D7A5-0B4D-9FA2-299F-55B8ED8D6D1A}"/>
-              </a:ext>
-            </a:extLst>
-          </p:cNvPr>
-          <p:cNvSpPr>
-            <a:spLocks noGrp="1"/>
-          </p:cNvSpPr>
-          <p:nvPr>
-            <p:ph type="ctrTitle"/>
+          <p:cNvPr id="4" name="Zástupný text 3">
+            <a:extLst>
+              <a:ext uri="{FF2B5EF4-FFF2-40B4-BE49-F238E27FC236}">
+                <a16:creationId xmlns:a16="http://schemas.microsoft.com/office/drawing/2014/main" id="{D3A2D3B7-17FE-1A37-4159-FC6FF7FF41D2}"/>
+              </a:ext>
+            </a:extLst>
+          </p:cNvPr>
+          <p:cNvSpPr>
+            <a:spLocks noGrp="1"/>
+          </p:cNvSpPr>
+          <p:nvPr>
+            <p:ph type="body" sz="quarter" idx="13"/>
           </p:nvPr>
         </p:nvSpPr>
         <p:spPr/>
         <p:txBody>
-          <a:bodyPr/>
-          <a:lstStyle/>
-          <a:p>
-            <a:endParaRPr lang="cs-CZ"/>
-          </a:p>
-        </p:txBody>
-      </p:sp>
-      <p:sp>
-        <p:nvSpPr>
-          <p:cNvPr id="16" name="Zástupný text 15">
-            <a:extLst>
-              <a:ext uri="{FF2B5EF4-FFF2-40B4-BE49-F238E27FC236}">
-                <a16:creationId xmlns:a16="http://schemas.microsoft.com/office/drawing/2014/main" id="{EAC5759F-4655-07F9-56AA-7867A39DB3CF}"/>
-              </a:ext>
-            </a:extLst>
-          </p:cNvPr>
-          <p:cNvSpPr>
-            <a:spLocks noGrp="1"/>
-          </p:cNvSpPr>
-          <p:nvPr>
-            <p:ph type="body" sz="quarter" idx="15"/>
-          </p:nvPr>
-        </p:nvSpPr>
-        <p:spPr/>
-        <p:txBody>
-          <a:bodyPr/>
-          <a:lstStyle/>
-          <a:p>
-            <a:endParaRPr lang="cs-CZ"/>
-          </a:p>
-        </p:txBody>
-      </p:sp>
-      <p:sp>
-        <p:nvSpPr>
-          <p:cNvPr id="17" name="Zástupný text 16">
-            <a:extLst>
-              <a:ext uri="{FF2B5EF4-FFF2-40B4-BE49-F238E27FC236}">
-                <a16:creationId xmlns:a16="http://schemas.microsoft.com/office/drawing/2014/main" id="{1C98B004-3A98-773F-6A8B-7B23E8E6E824}"/>
-              </a:ext>
-            </a:extLst>
-          </p:cNvPr>
-          <p:cNvSpPr>
-            <a:spLocks noGrp="1"/>
-          </p:cNvSpPr>
-          <p:nvPr>
-            <p:ph type="body" sz="quarter" idx="18"/>
-          </p:nvPr>
-        </p:nvSpPr>
-        <p:spPr/>
-        <p:txBody>
-          <a:bodyPr/>
-          <a:lstStyle/>
-          <a:p>
-            <a:endParaRPr lang="cs-CZ"/>
-          </a:p>
-        </p:txBody>
-      </p:sp>
-      <p:sp>
-        <p:nvSpPr>
-          <p:cNvPr id="19" name="Zástupný text 18">
-            <a:extLst>
-              <a:ext uri="{FF2B5EF4-FFF2-40B4-BE49-F238E27FC236}">
-                <a16:creationId xmlns:a16="http://schemas.microsoft.com/office/drawing/2014/main" id="{531531D6-3522-A791-B991-335662165F3F}"/>
-              </a:ext>
-            </a:extLst>
-          </p:cNvPr>
-          <p:cNvSpPr>
-            <a:spLocks noGrp="1"/>
-          </p:cNvSpPr>
-          <p:nvPr>
-            <p:ph type="body" sz="quarter" idx="14"/>
-          </p:nvPr>
-        </p:nvSpPr>
-        <p:spPr/>
-        <p:txBody>
-          <a:bodyPr/>
+          <a:bodyPr>
+            <a:normAutofit lnSpcReduction="10000"/>
+          </a:bodyPr>
           <a:lstStyle/>
           <a:p>
             <a:endParaRPr lang="cs-CZ"/>
@@ -8126,7 +8442,7 @@
     </p:spTree>
     <p:extLst>
       <p:ext uri="{BB962C8B-B14F-4D97-AF65-F5344CB8AC3E}">
-        <p14:creationId xmlns:p14="http://schemas.microsoft.com/office/powerpoint/2010/main" val="2743714645"/>
+        <p14:creationId xmlns:p14="http://schemas.microsoft.com/office/powerpoint/2010/main" val="2826146201"/>
       </p:ext>
     </p:extLst>
   </p:cSld>
@@ -8141,7 +8457,13 @@
   <p:cSld>
     <p:spTree>
       <p:nvGrpSpPr>
-        <p:cNvPr id="1" name=""/>
+        <p:cNvPr id="1" name="">
+          <a:extLst>
+            <a:ext uri="{FF2B5EF4-FFF2-40B4-BE49-F238E27FC236}">
+              <a16:creationId xmlns:a16="http://schemas.microsoft.com/office/drawing/2014/main" id="{A4D1D5C1-692F-E6D3-388D-A5800F45CC82}"/>
+            </a:ext>
+          </a:extLst>
+        </p:cNvPr>
         <p:cNvGrpSpPr/>
         <p:nvPr/>
       </p:nvGrpSpPr>
@@ -8158,22 +8480,20 @@
           <p:cNvPr id="4" name="Zástupný text 3">
             <a:extLst>
               <a:ext uri="{FF2B5EF4-FFF2-40B4-BE49-F238E27FC236}">
-                <a16:creationId xmlns:a16="http://schemas.microsoft.com/office/drawing/2014/main" id="{D3A2D3B7-17FE-1A37-4159-FC6FF7FF41D2}"/>
-              </a:ext>
-            </a:extLst>
-          </p:cNvPr>
-          <p:cNvSpPr>
-            <a:spLocks noGrp="1"/>
-          </p:cNvSpPr>
-          <p:nvPr>
-            <p:ph type="body" sz="quarter" idx="13"/>
+                <a16:creationId xmlns:a16="http://schemas.microsoft.com/office/drawing/2014/main" id="{D9A50DFB-7910-BEFD-6BB3-3DFBE25C5C5E}"/>
+              </a:ext>
+            </a:extLst>
+          </p:cNvPr>
+          <p:cNvSpPr>
+            <a:spLocks noGrp="1"/>
+          </p:cNvSpPr>
+          <p:nvPr>
+            <p:ph type="body" sz="quarter" idx="14"/>
           </p:nvPr>
         </p:nvSpPr>
         <p:spPr/>
         <p:txBody>
-          <a:bodyPr>
-            <a:normAutofit lnSpcReduction="10000"/>
-          </a:bodyPr>
+          <a:bodyPr/>
           <a:lstStyle/>
           <a:p>
             <a:endParaRPr lang="cs-CZ"/>
@@ -8183,7 +8503,7 @@
     </p:spTree>
     <p:extLst>
       <p:ext uri="{BB962C8B-B14F-4D97-AF65-F5344CB8AC3E}">
-        <p14:creationId xmlns:p14="http://schemas.microsoft.com/office/powerpoint/2010/main" val="2826146201"/>
+        <p14:creationId xmlns:p14="http://schemas.microsoft.com/office/powerpoint/2010/main" val="2390589274"/>
       </p:ext>
     </p:extLst>
   </p:cSld>
@@ -9005,15 +9325,6 @@
 </file>
 
 <file path=customXml/item1.xml><?xml version="1.0" encoding="utf-8"?>
-<?mso-contentType ?>
-<FormTemplates xmlns="http://schemas.microsoft.com/sharepoint/v3/contenttype/forms">
-  <Display>DocumentLibraryForm</Display>
-  <Edit>DocumentLibraryForm</Edit>
-  <New>DocumentLibraryForm</New>
-</FormTemplates>
-</file>
-
-<file path=customXml/item2.xml><?xml version="1.0" encoding="utf-8"?>
 <p:properties xmlns:p="http://schemas.microsoft.com/office/2006/metadata/properties" xmlns:xsi="http://www.w3.org/2001/XMLSchema-instance" xmlns:pc="http://schemas.microsoft.com/office/infopath/2007/PartnerControls">
   <documentManagement>
     <lcf76f155ced4ddcb4097134ff3c332f xmlns="5588eda9-dfb0-4862-9798-e949506d00a0">
@@ -9022,6 +9333,15 @@
     <TaxCatchAll xmlns="a1218e33-42f4-419c-a356-87b55791345d" xsi:nil="true"/>
   </documentManagement>
 </p:properties>
+</file>
+
+<file path=customXml/item2.xml><?xml version="1.0" encoding="utf-8"?>
+<?mso-contentType ?>
+<FormTemplates xmlns="http://schemas.microsoft.com/sharepoint/v3/contenttype/forms">
+  <Display>DocumentLibraryForm</Display>
+  <Edit>DocumentLibraryForm</Edit>
+  <New>DocumentLibraryForm</New>
+</FormTemplates>
 </file>
 
 <file path=customXml/item3.xml><?xml version="1.0" encoding="utf-8"?>
@@ -9260,14 +9580,6 @@
 </file>
 
 <file path=customXml/itemProps1.xml><?xml version="1.0" encoding="utf-8"?>
-<ds:datastoreItem xmlns:ds="http://schemas.openxmlformats.org/officeDocument/2006/customXml" ds:itemID="{6A0DCB3E-2761-4EF2-BF46-7254EE50A733}">
-  <ds:schemaRefs>
-    <ds:schemaRef ds:uri="http://schemas.microsoft.com/sharepoint/v3/contenttype/forms"/>
-  </ds:schemaRefs>
-</ds:datastoreItem>
-</file>
-
-<file path=customXml/itemProps2.xml><?xml version="1.0" encoding="utf-8"?>
 <ds:datastoreItem xmlns:ds="http://schemas.openxmlformats.org/officeDocument/2006/customXml" ds:itemID="{A9D73711-7102-4214-A720-AFE8469CA81F}">
   <ds:schemaRefs>
     <ds:schemaRef ds:uri="5588eda9-dfb0-4862-9798-e949506d00a0"/>
@@ -9280,6 +9592,14 @@
     <ds:schemaRef ds:uri="http://schemas.microsoft.com/office/infopath/2007/PartnerControls"/>
     <ds:schemaRef ds:uri="http://schemas.openxmlformats.org/package/2006/metadata/core-properties"/>
     <ds:schemaRef ds:uri="http://www.w3.org/XML/1998/namespace"/>
+  </ds:schemaRefs>
+</ds:datastoreItem>
+</file>
+
+<file path=customXml/itemProps2.xml><?xml version="1.0" encoding="utf-8"?>
+<ds:datastoreItem xmlns:ds="http://schemas.openxmlformats.org/officeDocument/2006/customXml" ds:itemID="{6A0DCB3E-2761-4EF2-BF46-7254EE50A733}">
+  <ds:schemaRefs>
+    <ds:schemaRef ds:uri="http://schemas.microsoft.com/sharepoint/v3/contenttype/forms"/>
   </ds:schemaRefs>
 </ds:datastoreItem>
 </file>

</xml_diff>